<commit_message>
small changes to tc and to slides
</commit_message>
<xml_diff>
--- a/docs/selenium.pptx
+++ b/docs/selenium.pptx
@@ -5,7 +5,7 @@
     <p:sldMasterId id="2147483660" r:id="rId1"/>
   </p:sldMasterIdLst>
   <p:notesMasterIdLst>
-    <p:notesMasterId r:id="rId48"/>
+    <p:notesMasterId r:id="rId51"/>
   </p:notesMasterIdLst>
   <p:sldIdLst>
     <p:sldId id="256" r:id="rId2"/>
@@ -44,16 +44,19 @@
     <p:sldId id="290" r:id="rId35"/>
     <p:sldId id="298" r:id="rId36"/>
     <p:sldId id="289" r:id="rId37"/>
-    <p:sldId id="292" r:id="rId38"/>
-    <p:sldId id="291" r:id="rId39"/>
-    <p:sldId id="294" r:id="rId40"/>
-    <p:sldId id="295" r:id="rId41"/>
-    <p:sldId id="299" r:id="rId42"/>
-    <p:sldId id="293" r:id="rId43"/>
-    <p:sldId id="296" r:id="rId44"/>
-    <p:sldId id="267" r:id="rId45"/>
-    <p:sldId id="300" r:id="rId46"/>
-    <p:sldId id="307" r:id="rId47"/>
+    <p:sldId id="310" r:id="rId38"/>
+    <p:sldId id="311" r:id="rId39"/>
+    <p:sldId id="292" r:id="rId40"/>
+    <p:sldId id="291" r:id="rId41"/>
+    <p:sldId id="294" r:id="rId42"/>
+    <p:sldId id="295" r:id="rId43"/>
+    <p:sldId id="299" r:id="rId44"/>
+    <p:sldId id="308" r:id="rId45"/>
+    <p:sldId id="293" r:id="rId46"/>
+    <p:sldId id="267" r:id="rId47"/>
+    <p:sldId id="300" r:id="rId48"/>
+    <p:sldId id="307" r:id="rId49"/>
+    <p:sldId id="309" r:id="rId50"/>
   </p:sldIdLst>
   <p:sldSz cx="12192000" cy="6858000"/>
   <p:notesSz cx="6858000" cy="9144000"/>
@@ -254,7 +257,7 @@
           <a:p>
             <a:fld id="{C4F1BBFF-356B-497B-986D-D95084085F9C}" type="datetimeFigureOut">
               <a:rPr lang="pl-PL" smtClean="0"/>
-              <a:t>2019-09-13</a:t>
+              <a:t>2020-02-17</a:t>
             </a:fld>
             <a:endParaRPr lang="pl-PL"/>
           </a:p>
@@ -749,7 +752,7 @@
           <a:p>
             <a:fld id="{35E6BC3E-B2AC-4750-95C0-43FB0C044642}" type="slidenum">
               <a:rPr lang="pl-PL" smtClean="0"/>
-              <a:t>37</a:t>
+              <a:t>39</a:t>
             </a:fld>
             <a:endParaRPr lang="pl-PL"/>
           </a:p>
@@ -839,7 +842,7 @@
           <a:p>
             <a:fld id="{35E6BC3E-B2AC-4750-95C0-43FB0C044642}" type="slidenum">
               <a:rPr lang="pl-PL" smtClean="0"/>
-              <a:t>38</a:t>
+              <a:t>40</a:t>
             </a:fld>
             <a:endParaRPr lang="pl-PL"/>
           </a:p>
@@ -929,7 +932,7 @@
           <a:p>
             <a:fld id="{35E6BC3E-B2AC-4750-95C0-43FB0C044642}" type="slidenum">
               <a:rPr lang="pl-PL" smtClean="0"/>
-              <a:t>39</a:t>
+              <a:t>41</a:t>
             </a:fld>
             <a:endParaRPr lang="pl-PL"/>
           </a:p>
@@ -1876,7 +1879,7 @@
           <a:p>
             <a:fld id="{FF23F29E-5D8A-4A81-BDA8-109DAB215F35}" type="datetime1">
               <a:rPr lang="pl-PL" smtClean="0"/>
-              <a:t>2019-09-13</a:t>
+              <a:t>2020-02-17</a:t>
             </a:fld>
             <a:endParaRPr lang="pl-PL"/>
           </a:p>
@@ -2146,7 +2149,7 @@
           <a:p>
             <a:fld id="{98E4F4AE-D1F3-4243-BBD9-D5D1C0DDCA86}" type="datetime1">
               <a:rPr lang="pl-PL" smtClean="0"/>
-              <a:t>2019-09-13</a:t>
+              <a:t>2020-02-17</a:t>
             </a:fld>
             <a:endParaRPr lang="pl-PL"/>
           </a:p>
@@ -2380,7 +2383,7 @@
           <a:p>
             <a:fld id="{66A24671-F602-4BD8-836F-6291F63126A7}" type="datetime1">
               <a:rPr lang="pl-PL" smtClean="0"/>
-              <a:t>2019-09-13</a:t>
+              <a:t>2020-02-17</a:t>
             </a:fld>
             <a:endParaRPr lang="pl-PL"/>
           </a:p>
@@ -2693,7 +2696,7 @@
           <a:p>
             <a:fld id="{38E1153E-4F1B-4689-88A5-2CE4BBCEA3CA}" type="datetime1">
               <a:rPr lang="pl-PL" smtClean="0"/>
-              <a:t>2019-09-13</a:t>
+              <a:t>2020-02-17</a:t>
             </a:fld>
             <a:endParaRPr lang="pl-PL"/>
           </a:p>
@@ -3169,7 +3172,7 @@
           <a:p>
             <a:fld id="{3B46DAC3-D68C-4605-A826-0C19289612D5}" type="datetime1">
               <a:rPr lang="pl-PL" smtClean="0"/>
-              <a:t>2019-09-13</a:t>
+              <a:t>2020-02-17</a:t>
             </a:fld>
             <a:endParaRPr lang="pl-PL"/>
           </a:p>
@@ -3719,7 +3722,7 @@
           <a:p>
             <a:fld id="{ECBC9E8C-AC20-42BD-8363-893637C52EAA}" type="datetime1">
               <a:rPr lang="pl-PL" smtClean="0"/>
-              <a:t>2019-09-13</a:t>
+              <a:t>2020-02-17</a:t>
             </a:fld>
             <a:endParaRPr lang="pl-PL"/>
           </a:p>
@@ -4496,7 +4499,7 @@
           <a:p>
             <a:fld id="{E30DF198-7012-4716-B31C-8CEF1BA89045}" type="datetime1">
               <a:rPr lang="pl-PL" smtClean="0"/>
-              <a:t>2019-09-13</a:t>
+              <a:t>2020-02-17</a:t>
             </a:fld>
             <a:endParaRPr lang="pl-PL"/>
           </a:p>
@@ -4674,7 +4677,7 @@
           <a:p>
             <a:fld id="{F8E04CCA-FCBF-494A-AF56-58DC9060DFB5}" type="datetime1">
               <a:rPr lang="pl-PL" smtClean="0"/>
-              <a:t>2019-09-13</a:t>
+              <a:t>2020-02-17</a:t>
             </a:fld>
             <a:endParaRPr lang="pl-PL"/>
           </a:p>
@@ -4900,7 +4903,7 @@
           <a:p>
             <a:fld id="{F046EABE-AF18-400C-B2F8-897E2D124A35}" type="datetime1">
               <a:rPr lang="pl-PL" smtClean="0"/>
-              <a:t>2019-09-13</a:t>
+              <a:t>2020-02-17</a:t>
             </a:fld>
             <a:endParaRPr lang="pl-PL"/>
           </a:p>
@@ -5083,7 +5086,7 @@
           <a:p>
             <a:fld id="{D323B2D7-CCB6-41EB-8C82-E3BEE3042DF4}" type="datetime1">
               <a:rPr lang="pl-PL" smtClean="0"/>
-              <a:t>2019-09-13</a:t>
+              <a:t>2020-02-17</a:t>
             </a:fld>
             <a:endParaRPr lang="pl-PL"/>
           </a:p>
@@ -5375,7 +5378,7 @@
           <a:p>
             <a:fld id="{5B825D4F-4C98-45A4-B93D-38761E988FC9}" type="datetime1">
               <a:rPr lang="pl-PL" smtClean="0"/>
-              <a:t>2019-09-13</a:t>
+              <a:t>2020-02-17</a:t>
             </a:fld>
             <a:endParaRPr lang="pl-PL"/>
           </a:p>
@@ -5620,7 +5623,7 @@
           <a:p>
             <a:fld id="{6C20AA97-1FC0-40CE-A8B4-E29D7D86CCCF}" type="datetime1">
               <a:rPr lang="pl-PL" smtClean="0"/>
-              <a:t>2019-09-13</a:t>
+              <a:t>2020-02-17</a:t>
             </a:fld>
             <a:endParaRPr lang="pl-PL"/>
           </a:p>
@@ -6002,7 +6005,7 @@
           <a:p>
             <a:fld id="{24E3CF80-A2CB-42DF-AEB3-B458D29CB087}" type="datetime1">
               <a:rPr lang="pl-PL" smtClean="0"/>
-              <a:t>2019-09-13</a:t>
+              <a:t>2020-02-17</a:t>
             </a:fld>
             <a:endParaRPr lang="pl-PL"/>
           </a:p>
@@ -6123,7 +6126,7 @@
           <a:p>
             <a:fld id="{2DBC3FFA-4F17-402C-9EA8-26AE84BE9FC5}" type="datetime1">
               <a:rPr lang="pl-PL" smtClean="0"/>
-              <a:t>2019-09-13</a:t>
+              <a:t>2020-02-17</a:t>
             </a:fld>
             <a:endParaRPr lang="pl-PL"/>
           </a:p>
@@ -6221,7 +6224,7 @@
           <a:p>
             <a:fld id="{829A09AC-1BF7-4ED5-AF14-3419C15FCA0F}" type="datetime1">
               <a:rPr lang="pl-PL" smtClean="0"/>
-              <a:t>2019-09-13</a:t>
+              <a:t>2020-02-17</a:t>
             </a:fld>
             <a:endParaRPr lang="pl-PL"/>
           </a:p>
@@ -6473,7 +6476,7 @@
           <a:p>
             <a:fld id="{C8A77040-75CB-45B4-8156-BB54164C7987}" type="datetime1">
               <a:rPr lang="pl-PL" smtClean="0"/>
-              <a:t>2019-09-13</a:t>
+              <a:t>2020-02-17</a:t>
             </a:fld>
             <a:endParaRPr lang="pl-PL"/>
           </a:p>
@@ -6733,7 +6736,7 @@
           <a:p>
             <a:fld id="{53988949-0D1E-42F0-940B-C19332FFF5A0}" type="datetime1">
               <a:rPr lang="pl-PL" smtClean="0"/>
-              <a:t>2019-09-13</a:t>
+              <a:t>2020-02-17</a:t>
             </a:fld>
             <a:endParaRPr lang="pl-PL"/>
           </a:p>
@@ -6979,7 +6982,7 @@
           <a:p>
             <a:fld id="{DC68CDA2-31C4-40B2-A83D-1CC05FB6C38D}" type="datetime1">
               <a:rPr lang="pl-PL" smtClean="0"/>
-              <a:t>2019-09-13</a:t>
+              <a:t>2020-02-17</a:t>
             </a:fld>
             <a:endParaRPr lang="pl-PL"/>
           </a:p>
@@ -8681,7 +8684,7 @@
             <a:pPr algn="ctr"/>
             <a:r>
               <a:rPr lang="pl-PL" dirty="0"/>
-              <a:t>Ok I </a:t>
+              <a:t>Ok! I </a:t>
             </a:r>
             <a:r>
               <a:rPr lang="pl-PL" dirty="0" err="1"/>
@@ -9184,7 +9187,7 @@
           <a:p>
             <a:r>
               <a:rPr lang="pl-PL" dirty="0" err="1"/>
-              <a:t>Lets</a:t>
+              <a:t>Let’s</a:t>
             </a:r>
             <a:r>
               <a:rPr lang="pl-PL" dirty="0"/>
@@ -9196,11 +9199,11 @@
             </a:r>
             <a:r>
               <a:rPr lang="pl-PL" dirty="0"/>
-              <a:t> </a:t>
+              <a:t> INTO </a:t>
             </a:r>
             <a:r>
               <a:rPr lang="pl-PL" dirty="0" err="1"/>
-              <a:t>how</a:t>
+              <a:t>ChromeDriver</a:t>
             </a:r>
             <a:r>
               <a:rPr lang="pl-PL" dirty="0"/>
@@ -9208,20 +9211,9 @@
             </a:r>
             <a:r>
               <a:rPr lang="pl-PL" dirty="0" err="1"/>
-              <a:t>ChromeDriver</a:t>
-            </a:r>
-            <a:r>
-              <a:rPr lang="pl-PL" dirty="0"/>
-              <a:t> </a:t>
-            </a:r>
-            <a:r>
-              <a:rPr lang="pl-PL" dirty="0" err="1"/>
-              <a:t>Does</a:t>
-            </a:r>
-            <a:r>
-              <a:rPr lang="pl-PL" dirty="0"/>
-              <a:t> It</a:t>
-            </a:r>
+              <a:t>COde</a:t>
+            </a:r>
+            <a:endParaRPr lang="pl-PL" dirty="0"/>
           </a:p>
         </p:txBody>
       </p:sp>
@@ -9907,8 +9899,20 @@
           <a:p>
             <a:pPr algn="l"/>
             <a:r>
-              <a:rPr lang="en-US" sz="4200"/>
-              <a:t>Selenium is used To Cure Merury Poisoning</a:t>
+              <a:rPr lang="en-US" sz="4200" dirty="0"/>
+              <a:t>Selenium is used To Cure Mer</a:t>
+            </a:r>
+            <a:r>
+              <a:rPr lang="pl-PL" sz="4200" dirty="0"/>
+              <a:t>c</a:t>
+            </a:r>
+            <a:r>
+              <a:rPr lang="en-US" sz="4200" dirty="0" err="1"/>
+              <a:t>ury</a:t>
+            </a:r>
+            <a:r>
+              <a:rPr lang="en-US" sz="4200" dirty="0"/>
+              <a:t> Poisoning</a:t>
             </a:r>
           </a:p>
         </p:txBody>
@@ -10194,8 +10198,20 @@
           <a:p>
             <a:pPr algn="l"/>
             <a:r>
-              <a:rPr lang="en-US" sz="4200"/>
-              <a:t>Selenium is used To Cure Merury Poisoning</a:t>
+              <a:rPr lang="en-US" sz="4200" dirty="0"/>
+              <a:t>Selenium is used To Cure Mer</a:t>
+            </a:r>
+            <a:r>
+              <a:rPr lang="pl-PL" sz="4200" dirty="0"/>
+              <a:t>c</a:t>
+            </a:r>
+            <a:r>
+              <a:rPr lang="en-US" sz="4200" dirty="0" err="1"/>
+              <a:t>ury</a:t>
+            </a:r>
+            <a:r>
+              <a:rPr lang="en-US" sz="4200" dirty="0"/>
+              <a:t> Poisoning</a:t>
             </a:r>
           </a:p>
         </p:txBody>
@@ -10584,7 +10600,7 @@
           <a:p>
             <a:r>
               <a:rPr lang="pl-PL" dirty="0" err="1"/>
-              <a:t>TableElemnet</a:t>
+              <a:t>ChainAnallyzer</a:t>
             </a:r>
             <a:r>
               <a:rPr lang="pl-PL" dirty="0"/>
@@ -10594,7 +10610,7 @@
               <a:rPr lang="pl-PL" dirty="0">
                 <a:hlinkClick r:id="rId3"/>
               </a:rPr>
-              <a:t>https://www.nuget.org/packages/TableElement</a:t>
+              <a:t>https://www.nuget.org/packages/ChainAnalyzer</a:t>
             </a:r>
             <a:endParaRPr lang="pl-PL" dirty="0"/>
           </a:p>
@@ -10680,7 +10696,7 @@
         </p:blipFill>
         <p:spPr>
           <a:xfrm>
-            <a:off x="4225374" y="4135969"/>
+            <a:off x="991520" y="4206622"/>
             <a:ext cx="2335772" cy="1479874"/>
           </a:xfrm>
           <a:prstGeom prst="rect">
@@ -10716,42 +10732,6 @@
           </a:p>
         </p:txBody>
       </p:sp>
-      <p:pic>
-        <p:nvPicPr>
-          <p:cNvPr id="9" name="Picture 8" descr="A close up of a logo&#10;&#10;Description automatically generated">
-            <a:extLst>
-              <a:ext uri="{FF2B5EF4-FFF2-40B4-BE49-F238E27FC236}">
-                <a16:creationId xmlns:a16="http://schemas.microsoft.com/office/drawing/2014/main" id="{CEEBCC2A-62E6-45B4-947E-64E84B0E4848}"/>
-              </a:ext>
-            </a:extLst>
-          </p:cNvPr>
-          <p:cNvPicPr>
-            <a:picLocks noChangeAspect="1"/>
-          </p:cNvPicPr>
-          <p:nvPr/>
-        </p:nvPicPr>
-        <p:blipFill>
-          <a:blip r:embed="rId6">
-            <a:extLst>
-              <a:ext uri="{28A0092B-C50C-407E-A947-70E740481C1C}">
-                <a14:useLocalDpi xmlns:a14="http://schemas.microsoft.com/office/drawing/2010/main" val="0"/>
-              </a:ext>
-            </a:extLst>
-          </a:blip>
-          <a:stretch>
-            <a:fillRect/>
-          </a:stretch>
-        </p:blipFill>
-        <p:spPr>
-          <a:xfrm>
-            <a:off x="814025" y="4206622"/>
-            <a:ext cx="2843575" cy="1610237"/>
-          </a:xfrm>
-          <a:prstGeom prst="rect">
-            <a:avLst/>
-          </a:prstGeom>
-        </p:spPr>
-      </p:pic>
     </p:spTree>
     <p:extLst>
       <p:ext uri="{BB962C8B-B14F-4D97-AF65-F5344CB8AC3E}">
@@ -12928,7 +12908,7 @@
             </a:r>
             <a:r>
               <a:rPr lang="pl-PL" dirty="0" err="1"/>
-              <a:t>Srtategies</a:t>
+              <a:t>Strategies</a:t>
             </a:r>
             <a:endParaRPr lang="pl-PL" dirty="0"/>
           </a:p>
@@ -12949,7 +12929,7 @@
           <p:nvPr>
             <p:extLst>
               <p:ext uri="{D42A27DB-BD31-4B8C-83A1-F6EECF244321}">
-                <p14:modId xmlns:p14="http://schemas.microsoft.com/office/powerpoint/2010/main" val="1646552947"/>
+                <p14:modId xmlns:p14="http://schemas.microsoft.com/office/powerpoint/2010/main" val="2234152526"/>
               </p:ext>
             </p:extLst>
           </p:nvPr>
@@ -12972,21 +12952,21 @@
                     </a:ext>
                   </a:extLst>
                 </a:gridCol>
-                <a:gridCol w="2479090">
+                <a:gridCol w="2373343">
                   <a:extLst>
                     <a:ext uri="{9D8B030D-6E8A-4147-A177-3AD203B41FA5}">
                       <a16:colId xmlns:a16="http://schemas.microsoft.com/office/drawing/2014/main" val="219359974"/>
                     </a:ext>
                   </a:extLst>
                 </a:gridCol>
-                <a:gridCol w="2479090">
+                <a:gridCol w="3035559">
                   <a:extLst>
                     <a:ext uri="{9D8B030D-6E8A-4147-A177-3AD203B41FA5}">
                       <a16:colId xmlns:a16="http://schemas.microsoft.com/office/drawing/2014/main" val="2068072936"/>
                     </a:ext>
                   </a:extLst>
                 </a:gridCol>
-                <a:gridCol w="2479090">
+                <a:gridCol w="2028368">
                   <a:extLst>
                     <a:ext uri="{9D8B030D-6E8A-4147-A177-3AD203B41FA5}">
                       <a16:colId xmlns:a16="http://schemas.microsoft.com/office/drawing/2014/main" val="2259700630"/>
@@ -13048,12 +13028,18 @@
                     <a:p>
                       <a:pPr algn="ctr" fontAlgn="b"/>
                       <a:r>
-                        <a:rPr lang="pl-PL" sz="1100" u="none" strike="noStrike">
+                        <a:rPr lang="pl-PL" sz="1100" u="none" strike="noStrike" dirty="0">
                           <a:effectLst/>
                         </a:rPr>
-                        <a:t>DOM call</a:t>
+                        <a:t>DOM </a:t>
                       </a:r>
-                      <a:endParaRPr lang="pl-PL" sz="1100" b="1" i="0" u="none" strike="noStrike">
+                      <a:r>
+                        <a:rPr lang="pl-PL" sz="1100" u="none" strike="noStrike" dirty="0" err="1">
+                          <a:effectLst/>
+                        </a:rPr>
+                        <a:t>call</a:t>
+                      </a:r>
+                      <a:endParaRPr lang="pl-PL" sz="1100" b="1" i="0" u="none" strike="noStrike" dirty="0">
                         <a:solidFill>
                           <a:srgbClr val="FFFFFF"/>
                         </a:solidFill>
@@ -13071,12 +13057,12 @@
                     <a:p>
                       <a:pPr algn="ctr" fontAlgn="b"/>
                       <a:r>
-                        <a:rPr lang="pl-PL" sz="1100" u="none" strike="noStrike">
+                        <a:rPr lang="pl-PL" sz="1100" u="none" strike="noStrike" dirty="0">
                           <a:effectLst/>
                         </a:rPr>
                         <a:t>DOM LEVEL</a:t>
                       </a:r>
-                      <a:endParaRPr lang="pl-PL" sz="1100" b="1" i="0" u="none" strike="noStrike">
+                      <a:endParaRPr lang="pl-PL" sz="1100" b="1" i="0" u="none" strike="noStrike" dirty="0">
                         <a:solidFill>
                           <a:srgbClr val="FFFFFF"/>
                         </a:solidFill>
@@ -13168,12 +13154,12 @@
                     <a:p>
                       <a:pPr algn="ctr" fontAlgn="b"/>
                       <a:r>
-                        <a:rPr lang="pl-PL" sz="2000" u="none" strike="noStrike">
+                        <a:rPr lang="pl-PL" sz="2000" u="none" strike="noStrike" dirty="0" err="1">
                           <a:effectLst/>
                         </a:rPr>
                         <a:t>querySelectorAll</a:t>
                       </a:r>
-                      <a:endParaRPr lang="pl-PL" sz="2000" b="0" i="0" u="none" strike="noStrike">
+                      <a:endParaRPr lang="pl-PL" sz="2000" b="0" i="0" u="none" strike="noStrike" dirty="0">
                         <a:solidFill>
                           <a:srgbClr val="000000"/>
                         </a:solidFill>
@@ -14927,14 +14913,6 @@
 <file path=ppt/slides/slide37.xml><?xml version="1.0" encoding="utf-8"?>
 <p:sld xmlns:a="http://schemas.openxmlformats.org/drawingml/2006/main" xmlns:r="http://schemas.openxmlformats.org/officeDocument/2006/relationships" xmlns:p="http://schemas.openxmlformats.org/presentationml/2006/main">
   <p:cSld>
-    <p:bg>
-      <p:bgPr>
-        <a:solidFill>
-          <a:schemeClr val="bg1"/>
-        </a:solidFill>
-        <a:effectLst/>
-      </p:bgPr>
-    </p:bg>
     <p:spTree>
       <p:nvGrpSpPr>
         <p:cNvPr id="1" name=""/>
@@ -14949,92 +14927,85 @@
           <a:chExt cx="0" cy="0"/>
         </a:xfrm>
       </p:grpSpPr>
+      <p:sp>
+        <p:nvSpPr>
+          <p:cNvPr id="5" name="Footer Placeholder 4">
+            <a:extLst>
+              <a:ext uri="{FF2B5EF4-FFF2-40B4-BE49-F238E27FC236}">
+                <a16:creationId xmlns:a16="http://schemas.microsoft.com/office/drawing/2014/main" id="{73BA48D0-9F31-4745-B000-DC453E197963}"/>
+              </a:ext>
+            </a:extLst>
+          </p:cNvPr>
+          <p:cNvSpPr>
+            <a:spLocks noGrp="1"/>
+          </p:cNvSpPr>
+          <p:nvPr>
+            <p:ph type="ftr" sz="quarter" idx="11"/>
+          </p:nvPr>
+        </p:nvSpPr>
+        <p:spPr/>
+        <p:txBody>
+          <a:bodyPr/>
+          <a:lstStyle/>
+          <a:p>
+            <a:r>
+              <a:rPr lang="pl-PL"/>
+              <a:t>@maciejwyrodek</a:t>
+            </a:r>
+          </a:p>
+        </p:txBody>
+      </p:sp>
       <p:pic>
         <p:nvPicPr>
-          <p:cNvPr id="5" name="Picture 4">
-            <a:extLst>
-              <a:ext uri="{FF2B5EF4-FFF2-40B4-BE49-F238E27FC236}">
-                <a16:creationId xmlns:a16="http://schemas.microsoft.com/office/drawing/2014/main" id="{BB8460CE-9324-432D-B636-3C8E1D52CAA3}"/>
+          <p:cNvPr id="1026" name="Picture 2">
+            <a:extLst>
+              <a:ext uri="{FF2B5EF4-FFF2-40B4-BE49-F238E27FC236}">
+                <a16:creationId xmlns:a16="http://schemas.microsoft.com/office/drawing/2014/main" id="{370E095F-0A73-4C96-8E1B-8C1EA9BF1CE8}"/>
               </a:ext>
             </a:extLst>
           </p:cNvPr>
           <p:cNvPicPr>
-            <a:picLocks noChangeAspect="1"/>
+            <a:picLocks noChangeAspect="1" noChangeArrowheads="1"/>
           </p:cNvPicPr>
           <p:nvPr/>
         </p:nvPicPr>
-        <p:blipFill rotWithShape="1">
-          <a:blip r:embed="rId3"/>
-          <a:srcRect r="11111"/>
-          <a:stretch/>
+        <p:blipFill>
+          <a:blip r:embed="rId2">
+            <a:extLst>
+              <a:ext uri="{28A0092B-C50C-407E-A947-70E740481C1C}">
+                <a14:useLocalDpi xmlns:a14="http://schemas.microsoft.com/office/drawing/2010/main" val="0"/>
+              </a:ext>
+            </a:extLst>
+          </a:blip>
+          <a:srcRect/>
+          <a:stretch>
+            <a:fillRect/>
+          </a:stretch>
         </p:blipFill>
-        <p:spPr>
+        <p:spPr bwMode="auto">
           <a:xfrm>
-            <a:off x="20" y="10"/>
-            <a:ext cx="12191980" cy="6857990"/>
+            <a:off x="1446275" y="2851150"/>
+            <a:ext cx="10157691" cy="1117346"/>
           </a:xfrm>
           <a:prstGeom prst="rect">
             <a:avLst/>
           </a:prstGeom>
+          <a:noFill/>
+          <a:extLst>
+            <a:ext uri="{909E8E84-426E-40DD-AFC4-6F175D3DCCD1}">
+              <a14:hiddenFill xmlns:a14="http://schemas.microsoft.com/office/drawing/2010/main">
+                <a:solidFill>
+                  <a:srgbClr val="FFFFFF"/>
+                </a:solidFill>
+              </a14:hiddenFill>
+            </a:ext>
+          </a:extLst>
         </p:spPr>
       </p:pic>
-      <p:sp>
-        <p:nvSpPr>
-          <p:cNvPr id="6" name="Footer Placeholder 5">
-            <a:extLst>
-              <a:ext uri="{FF2B5EF4-FFF2-40B4-BE49-F238E27FC236}">
-                <a16:creationId xmlns:a16="http://schemas.microsoft.com/office/drawing/2014/main" id="{7135CE8E-514F-41EE-9C32-16BDFCD8882F}"/>
-              </a:ext>
-            </a:extLst>
-          </p:cNvPr>
-          <p:cNvSpPr>
-            <a:spLocks noGrp="1"/>
-          </p:cNvSpPr>
-          <p:nvPr>
-            <p:ph type="ftr" sz="quarter" idx="11"/>
-          </p:nvPr>
-        </p:nvSpPr>
-        <p:spPr/>
-        <p:txBody>
-          <a:bodyPr/>
-          <a:lstStyle/>
-          <a:p>
-            <a:r>
-              <a:rPr lang="pl-PL"/>
-              <a:t>@maciejwyrodek</a:t>
-            </a:r>
-          </a:p>
-        </p:txBody>
-      </p:sp>
-      <p:sp>
-        <p:nvSpPr>
-          <p:cNvPr id="4" name="Title 3">
-            <a:extLst>
-              <a:ext uri="{FF2B5EF4-FFF2-40B4-BE49-F238E27FC236}">
-                <a16:creationId xmlns:a16="http://schemas.microsoft.com/office/drawing/2014/main" id="{8CE0B58C-ECD8-4ADB-AD24-6CEA6B5F78F7}"/>
-              </a:ext>
-            </a:extLst>
-          </p:cNvPr>
-          <p:cNvSpPr>
-            <a:spLocks noGrp="1"/>
-          </p:cNvSpPr>
-          <p:nvPr>
-            <p:ph type="title"/>
-          </p:nvPr>
-        </p:nvSpPr>
-        <p:spPr/>
-        <p:txBody>
-          <a:bodyPr/>
-          <a:lstStyle/>
-          <a:p>
-            <a:endParaRPr lang="pl-PL"/>
-          </a:p>
-        </p:txBody>
-      </p:sp>
     </p:spTree>
     <p:extLst>
       <p:ext uri="{BB962C8B-B14F-4D97-AF65-F5344CB8AC3E}">
-        <p14:creationId xmlns:p14="http://schemas.microsoft.com/office/powerpoint/2010/main" val="375220345"/>
+        <p14:creationId xmlns:p14="http://schemas.microsoft.com/office/powerpoint/2010/main" val="2809424453"/>
       </p:ext>
     </p:extLst>
   </p:cSld>
@@ -15063,10 +15034,10 @@
       </p:grpSpPr>
       <p:sp>
         <p:nvSpPr>
-          <p:cNvPr id="5" name="Title 4">
-            <a:extLst>
-              <a:ext uri="{FF2B5EF4-FFF2-40B4-BE49-F238E27FC236}">
-                <a16:creationId xmlns:a16="http://schemas.microsoft.com/office/drawing/2014/main" id="{7992FB27-9845-4760-87FA-140F36AF83E5}"/>
+          <p:cNvPr id="2" name="Title 1">
+            <a:extLst>
+              <a:ext uri="{FF2B5EF4-FFF2-40B4-BE49-F238E27FC236}">
+                <a16:creationId xmlns:a16="http://schemas.microsoft.com/office/drawing/2014/main" id="{6339AFCE-AF95-4875-A4B9-FF7985C462FA}"/>
               </a:ext>
             </a:extLst>
           </p:cNvPr>
@@ -15084,104 +15055,123 @@
           <a:p>
             <a:r>
               <a:rPr lang="pl-PL" dirty="0" err="1"/>
-              <a:t>QuerySelectorAll</a:t>
-            </a:r>
+              <a:t>wEBKIT</a:t>
+            </a:r>
+            <a:r>
+              <a:rPr lang="pl-PL" dirty="0"/>
+              <a:t> MAIN FLOW</a:t>
+            </a:r>
+            <a:br>
+              <a:rPr lang="pl-PL" dirty="0"/>
+            </a:br>
             <a:endParaRPr lang="pl-PL" dirty="0"/>
+          </a:p>
+        </p:txBody>
+      </p:sp>
+      <p:sp>
+        <p:nvSpPr>
+          <p:cNvPr id="3" name="Content Placeholder 2">
+            <a:extLst>
+              <a:ext uri="{FF2B5EF4-FFF2-40B4-BE49-F238E27FC236}">
+                <a16:creationId xmlns:a16="http://schemas.microsoft.com/office/drawing/2014/main" id="{5D570D6E-F494-4B4B-B849-7F01D8507CB9}"/>
+              </a:ext>
+            </a:extLst>
+          </p:cNvPr>
+          <p:cNvSpPr>
+            <a:spLocks noGrp="1"/>
+          </p:cNvSpPr>
+          <p:nvPr>
+            <p:ph idx="1"/>
+          </p:nvPr>
+        </p:nvSpPr>
+        <p:spPr/>
+        <p:txBody>
+          <a:bodyPr/>
+          <a:lstStyle/>
+          <a:p>
+            <a:endParaRPr lang="pl-PL"/>
+          </a:p>
+        </p:txBody>
+      </p:sp>
+      <p:sp>
+        <p:nvSpPr>
+          <p:cNvPr id="5" name="Footer Placeholder 4">
+            <a:extLst>
+              <a:ext uri="{FF2B5EF4-FFF2-40B4-BE49-F238E27FC236}">
+                <a16:creationId xmlns:a16="http://schemas.microsoft.com/office/drawing/2014/main" id="{73BA48D0-9F31-4745-B000-DC453E197963}"/>
+              </a:ext>
+            </a:extLst>
+          </p:cNvPr>
+          <p:cNvSpPr>
+            <a:spLocks noGrp="1"/>
+          </p:cNvSpPr>
+          <p:nvPr>
+            <p:ph type="ftr" sz="quarter" idx="11"/>
+          </p:nvPr>
+        </p:nvSpPr>
+        <p:spPr/>
+        <p:txBody>
+          <a:bodyPr/>
+          <a:lstStyle/>
+          <a:p>
+            <a:r>
+              <a:rPr lang="pl-PL"/>
+              <a:t>@maciejwyrodek</a:t>
+            </a:r>
           </a:p>
         </p:txBody>
       </p:sp>
       <p:pic>
         <p:nvPicPr>
-          <p:cNvPr id="7" name="Picture 6">
-            <a:extLst>
-              <a:ext uri="{FF2B5EF4-FFF2-40B4-BE49-F238E27FC236}">
-                <a16:creationId xmlns:a16="http://schemas.microsoft.com/office/drawing/2014/main" id="{AFF1ECA5-E3CE-4CD4-8249-E136AAECB6DC}"/>
+          <p:cNvPr id="2050" name="Picture 2">
+            <a:extLst>
+              <a:ext uri="{FF2B5EF4-FFF2-40B4-BE49-F238E27FC236}">
+                <a16:creationId xmlns:a16="http://schemas.microsoft.com/office/drawing/2014/main" id="{7A6F395E-95BB-44E6-AB1D-E48B9787287E}"/>
               </a:ext>
             </a:extLst>
           </p:cNvPr>
           <p:cNvPicPr>
-            <a:picLocks noChangeAspect="1"/>
+            <a:picLocks noChangeAspect="1" noChangeArrowheads="1"/>
           </p:cNvPicPr>
           <p:nvPr/>
         </p:nvPicPr>
         <p:blipFill>
-          <a:blip r:embed="rId3"/>
+          <a:blip r:embed="rId2">
+            <a:extLst>
+              <a:ext uri="{28A0092B-C50C-407E-A947-70E740481C1C}">
+                <a14:useLocalDpi xmlns:a14="http://schemas.microsoft.com/office/drawing/2010/main" val="0"/>
+              </a:ext>
+            </a:extLst>
+          </a:blip>
+          <a:srcRect/>
           <a:stretch>
             <a:fillRect/>
           </a:stretch>
         </p:blipFill>
-        <p:spPr>
+        <p:spPr bwMode="auto">
           <a:xfrm>
-            <a:off x="1000999" y="1690688"/>
-            <a:ext cx="9648825" cy="828675"/>
+            <a:off x="926985" y="1213436"/>
+            <a:ext cx="10338030" cy="4787966"/>
           </a:xfrm>
           <a:prstGeom prst="rect">
             <a:avLst/>
           </a:prstGeom>
+          <a:noFill/>
+          <a:extLst>
+            <a:ext uri="{909E8E84-426E-40DD-AFC4-6F175D3DCCD1}">
+              <a14:hiddenFill xmlns:a14="http://schemas.microsoft.com/office/drawing/2010/main">
+                <a:solidFill>
+                  <a:srgbClr val="FFFFFF"/>
+                </a:solidFill>
+              </a14:hiddenFill>
+            </a:ext>
+          </a:extLst>
         </p:spPr>
       </p:pic>
-      <p:pic>
-        <p:nvPicPr>
-          <p:cNvPr id="8" name="Picture 7">
-            <a:extLst>
-              <a:ext uri="{FF2B5EF4-FFF2-40B4-BE49-F238E27FC236}">
-                <a16:creationId xmlns:a16="http://schemas.microsoft.com/office/drawing/2014/main" id="{B12FC226-3CCE-4698-B78A-4D4D33D239D7}"/>
-              </a:ext>
-            </a:extLst>
-          </p:cNvPr>
-          <p:cNvPicPr>
-            <a:picLocks noChangeAspect="1"/>
-          </p:cNvPicPr>
-          <p:nvPr/>
-        </p:nvPicPr>
-        <p:blipFill>
-          <a:blip r:embed="rId4"/>
-          <a:stretch>
-            <a:fillRect/>
-          </a:stretch>
-        </p:blipFill>
-        <p:spPr>
-          <a:xfrm>
-            <a:off x="0" y="2895022"/>
-            <a:ext cx="12192000" cy="3158013"/>
-          </a:xfrm>
-          <a:prstGeom prst="rect">
-            <a:avLst/>
-          </a:prstGeom>
-        </p:spPr>
-      </p:pic>
-      <p:sp>
-        <p:nvSpPr>
-          <p:cNvPr id="9" name="Footer Placeholder 8">
-            <a:extLst>
-              <a:ext uri="{FF2B5EF4-FFF2-40B4-BE49-F238E27FC236}">
-                <a16:creationId xmlns:a16="http://schemas.microsoft.com/office/drawing/2014/main" id="{3015FDF2-4535-40E8-AD69-8A42856F585A}"/>
-              </a:ext>
-            </a:extLst>
-          </p:cNvPr>
-          <p:cNvSpPr>
-            <a:spLocks noGrp="1"/>
-          </p:cNvSpPr>
-          <p:nvPr>
-            <p:ph type="ftr" sz="quarter" idx="11"/>
-          </p:nvPr>
-        </p:nvSpPr>
-        <p:spPr/>
-        <p:txBody>
-          <a:bodyPr/>
-          <a:lstStyle/>
-          <a:p>
-            <a:r>
-              <a:rPr lang="pl-PL"/>
-              <a:t>@maciejwyrodek</a:t>
-            </a:r>
-          </a:p>
-        </p:txBody>
-      </p:sp>
     </p:spTree>
     <p:extLst>
       <p:ext uri="{BB962C8B-B14F-4D97-AF65-F5344CB8AC3E}">
-        <p14:creationId xmlns:p14="http://schemas.microsoft.com/office/powerpoint/2010/main" val="2957478153"/>
+        <p14:creationId xmlns:p14="http://schemas.microsoft.com/office/powerpoint/2010/main" val="2405251073"/>
       </p:ext>
     </p:extLst>
   </p:cSld>
@@ -15194,6 +15184,14 @@
 <file path=ppt/slides/slide39.xml><?xml version="1.0" encoding="utf-8"?>
 <p:sld xmlns:a="http://schemas.openxmlformats.org/drawingml/2006/main" xmlns:r="http://schemas.openxmlformats.org/officeDocument/2006/relationships" xmlns:p="http://schemas.openxmlformats.org/presentationml/2006/main">
   <p:cSld>
+    <p:bg>
+      <p:bgPr>
+        <a:solidFill>
+          <a:schemeClr val="bg1"/>
+        </a:solidFill>
+        <a:effectLst/>
+      </p:bgPr>
+    </p:bg>
     <p:spTree>
       <p:nvGrpSpPr>
         <p:cNvPr id="1" name=""/>
@@ -15208,57 +15206,29 @@
           <a:chExt cx="0" cy="0"/>
         </a:xfrm>
       </p:grpSpPr>
-      <p:sp>
-        <p:nvSpPr>
-          <p:cNvPr id="2" name="Title 1">
-            <a:extLst>
-              <a:ext uri="{FF2B5EF4-FFF2-40B4-BE49-F238E27FC236}">
-                <a16:creationId xmlns:a16="http://schemas.microsoft.com/office/drawing/2014/main" id="{E791D93C-47E8-4001-9A01-6F0209A03D63}"/>
-              </a:ext>
-            </a:extLst>
-          </p:cNvPr>
-          <p:cNvSpPr>
-            <a:spLocks noGrp="1"/>
-          </p:cNvSpPr>
-          <p:nvPr>
-            <p:ph type="title"/>
-          </p:nvPr>
-        </p:nvSpPr>
-        <p:spPr/>
-        <p:txBody>
-          <a:bodyPr/>
-          <a:lstStyle/>
-          <a:p>
-            <a:endParaRPr lang="pl-PL" dirty="0"/>
-          </a:p>
-        </p:txBody>
-      </p:sp>
       <p:pic>
         <p:nvPicPr>
-          <p:cNvPr id="4" name="Content Placeholder 3">
-            <a:extLst>
-              <a:ext uri="{FF2B5EF4-FFF2-40B4-BE49-F238E27FC236}">
-                <a16:creationId xmlns:a16="http://schemas.microsoft.com/office/drawing/2014/main" id="{2583F746-860B-46F3-B5A4-5BDD9F105544}"/>
+          <p:cNvPr id="5" name="Picture 4">
+            <a:extLst>
+              <a:ext uri="{FF2B5EF4-FFF2-40B4-BE49-F238E27FC236}">
+                <a16:creationId xmlns:a16="http://schemas.microsoft.com/office/drawing/2014/main" id="{BB8460CE-9324-432D-B636-3C8E1D52CAA3}"/>
               </a:ext>
             </a:extLst>
           </p:cNvPr>
           <p:cNvPicPr>
-            <a:picLocks noGrp="1" noChangeAspect="1"/>
+            <a:picLocks noChangeAspect="1"/>
           </p:cNvPicPr>
-          <p:nvPr>
-            <p:ph idx="1"/>
-          </p:nvPr>
+          <p:nvPr/>
         </p:nvPicPr>
-        <p:blipFill>
+        <p:blipFill rotWithShape="1">
           <a:blip r:embed="rId3"/>
-          <a:stretch>
-            <a:fillRect/>
-          </a:stretch>
+          <a:srcRect r="11111"/>
+          <a:stretch/>
         </p:blipFill>
         <p:spPr>
           <a:xfrm>
-            <a:off x="1519237" y="2763044"/>
-            <a:ext cx="9153525" cy="2886075"/>
+            <a:off x="20" y="10"/>
+            <a:ext cx="12191980" cy="6857990"/>
           </a:xfrm>
           <a:prstGeom prst="rect">
             <a:avLst/>
@@ -15267,10 +15237,10 @@
       </p:pic>
       <p:sp>
         <p:nvSpPr>
-          <p:cNvPr id="5" name="Footer Placeholder 4">
-            <a:extLst>
-              <a:ext uri="{FF2B5EF4-FFF2-40B4-BE49-F238E27FC236}">
-                <a16:creationId xmlns:a16="http://schemas.microsoft.com/office/drawing/2014/main" id="{16931B56-37A1-4110-90D7-B88E6A4A53D4}"/>
+          <p:cNvPr id="6" name="Footer Placeholder 5">
+            <a:extLst>
+              <a:ext uri="{FF2B5EF4-FFF2-40B4-BE49-F238E27FC236}">
+                <a16:creationId xmlns:a16="http://schemas.microsoft.com/office/drawing/2014/main" id="{7135CE8E-514F-41EE-9C32-16BDFCD8882F}"/>
               </a:ext>
             </a:extLst>
           </p:cNvPr>
@@ -15290,13 +15260,38 @@
               <a:rPr lang="pl-PL"/>
               <a:t>@maciejwyrodek</a:t>
             </a:r>
+          </a:p>
+        </p:txBody>
+      </p:sp>
+      <p:sp>
+        <p:nvSpPr>
+          <p:cNvPr id="4" name="Title 3">
+            <a:extLst>
+              <a:ext uri="{FF2B5EF4-FFF2-40B4-BE49-F238E27FC236}">
+                <a16:creationId xmlns:a16="http://schemas.microsoft.com/office/drawing/2014/main" id="{8CE0B58C-ECD8-4ADB-AD24-6CEA6B5F78F7}"/>
+              </a:ext>
+            </a:extLst>
+          </p:cNvPr>
+          <p:cNvSpPr>
+            <a:spLocks noGrp="1"/>
+          </p:cNvSpPr>
+          <p:nvPr>
+            <p:ph type="title"/>
+          </p:nvPr>
+        </p:nvSpPr>
+        <p:spPr/>
+        <p:txBody>
+          <a:bodyPr/>
+          <a:lstStyle/>
+          <a:p>
+            <a:endParaRPr lang="pl-PL"/>
           </a:p>
         </p:txBody>
       </p:sp>
     </p:spTree>
     <p:extLst>
       <p:ext uri="{BB962C8B-B14F-4D97-AF65-F5344CB8AC3E}">
-        <p14:creationId xmlns:p14="http://schemas.microsoft.com/office/powerpoint/2010/main" val="969425584"/>
+        <p14:creationId xmlns:p14="http://schemas.microsoft.com/office/powerpoint/2010/main" val="375220345"/>
       </p:ext>
     </p:extLst>
   </p:cSld>
@@ -15503,6 +15498,268 @@
       </p:grpSpPr>
       <p:sp>
         <p:nvSpPr>
+          <p:cNvPr id="5" name="Title 4">
+            <a:extLst>
+              <a:ext uri="{FF2B5EF4-FFF2-40B4-BE49-F238E27FC236}">
+                <a16:creationId xmlns:a16="http://schemas.microsoft.com/office/drawing/2014/main" id="{7992FB27-9845-4760-87FA-140F36AF83E5}"/>
+              </a:ext>
+            </a:extLst>
+          </p:cNvPr>
+          <p:cNvSpPr>
+            <a:spLocks noGrp="1"/>
+          </p:cNvSpPr>
+          <p:nvPr>
+            <p:ph type="title"/>
+          </p:nvPr>
+        </p:nvSpPr>
+        <p:spPr/>
+        <p:txBody>
+          <a:bodyPr/>
+          <a:lstStyle/>
+          <a:p>
+            <a:r>
+              <a:rPr lang="pl-PL" dirty="0" err="1"/>
+              <a:t>QuerySelectorAll</a:t>
+            </a:r>
+            <a:endParaRPr lang="pl-PL" dirty="0"/>
+          </a:p>
+        </p:txBody>
+      </p:sp>
+      <p:pic>
+        <p:nvPicPr>
+          <p:cNvPr id="7" name="Picture 6">
+            <a:extLst>
+              <a:ext uri="{FF2B5EF4-FFF2-40B4-BE49-F238E27FC236}">
+                <a16:creationId xmlns:a16="http://schemas.microsoft.com/office/drawing/2014/main" id="{AFF1ECA5-E3CE-4CD4-8249-E136AAECB6DC}"/>
+              </a:ext>
+            </a:extLst>
+          </p:cNvPr>
+          <p:cNvPicPr>
+            <a:picLocks noChangeAspect="1"/>
+          </p:cNvPicPr>
+          <p:nvPr/>
+        </p:nvPicPr>
+        <p:blipFill>
+          <a:blip r:embed="rId3"/>
+          <a:stretch>
+            <a:fillRect/>
+          </a:stretch>
+        </p:blipFill>
+        <p:spPr>
+          <a:xfrm>
+            <a:off x="1000999" y="1690688"/>
+            <a:ext cx="9648825" cy="828675"/>
+          </a:xfrm>
+          <a:prstGeom prst="rect">
+            <a:avLst/>
+          </a:prstGeom>
+        </p:spPr>
+      </p:pic>
+      <p:pic>
+        <p:nvPicPr>
+          <p:cNvPr id="8" name="Picture 7">
+            <a:extLst>
+              <a:ext uri="{FF2B5EF4-FFF2-40B4-BE49-F238E27FC236}">
+                <a16:creationId xmlns:a16="http://schemas.microsoft.com/office/drawing/2014/main" id="{B12FC226-3CCE-4698-B78A-4D4D33D239D7}"/>
+              </a:ext>
+            </a:extLst>
+          </p:cNvPr>
+          <p:cNvPicPr>
+            <a:picLocks noChangeAspect="1"/>
+          </p:cNvPicPr>
+          <p:nvPr/>
+        </p:nvPicPr>
+        <p:blipFill>
+          <a:blip r:embed="rId4"/>
+          <a:stretch>
+            <a:fillRect/>
+          </a:stretch>
+        </p:blipFill>
+        <p:spPr>
+          <a:xfrm>
+            <a:off x="0" y="2895022"/>
+            <a:ext cx="12192000" cy="3158013"/>
+          </a:xfrm>
+          <a:prstGeom prst="rect">
+            <a:avLst/>
+          </a:prstGeom>
+        </p:spPr>
+      </p:pic>
+      <p:sp>
+        <p:nvSpPr>
+          <p:cNvPr id="9" name="Footer Placeholder 8">
+            <a:extLst>
+              <a:ext uri="{FF2B5EF4-FFF2-40B4-BE49-F238E27FC236}">
+                <a16:creationId xmlns:a16="http://schemas.microsoft.com/office/drawing/2014/main" id="{3015FDF2-4535-40E8-AD69-8A42856F585A}"/>
+              </a:ext>
+            </a:extLst>
+          </p:cNvPr>
+          <p:cNvSpPr>
+            <a:spLocks noGrp="1"/>
+          </p:cNvSpPr>
+          <p:nvPr>
+            <p:ph type="ftr" sz="quarter" idx="11"/>
+          </p:nvPr>
+        </p:nvSpPr>
+        <p:spPr/>
+        <p:txBody>
+          <a:bodyPr/>
+          <a:lstStyle/>
+          <a:p>
+            <a:r>
+              <a:rPr lang="pl-PL"/>
+              <a:t>@maciejwyrodek</a:t>
+            </a:r>
+          </a:p>
+        </p:txBody>
+      </p:sp>
+    </p:spTree>
+    <p:extLst>
+      <p:ext uri="{BB962C8B-B14F-4D97-AF65-F5344CB8AC3E}">
+        <p14:creationId xmlns:p14="http://schemas.microsoft.com/office/powerpoint/2010/main" val="2957478153"/>
+      </p:ext>
+    </p:extLst>
+  </p:cSld>
+  <p:clrMapOvr>
+    <a:masterClrMapping/>
+  </p:clrMapOvr>
+</p:sld>
+</file>
+
+<file path=ppt/slides/slide41.xml><?xml version="1.0" encoding="utf-8"?>
+<p:sld xmlns:a="http://schemas.openxmlformats.org/drawingml/2006/main" xmlns:r="http://schemas.openxmlformats.org/officeDocument/2006/relationships" xmlns:p="http://schemas.openxmlformats.org/presentationml/2006/main">
+  <p:cSld>
+    <p:spTree>
+      <p:nvGrpSpPr>
+        <p:cNvPr id="1" name=""/>
+        <p:cNvGrpSpPr/>
+        <p:nvPr/>
+      </p:nvGrpSpPr>
+      <p:grpSpPr>
+        <a:xfrm>
+          <a:off x="0" y="0"/>
+          <a:ext cx="0" cy="0"/>
+          <a:chOff x="0" y="0"/>
+          <a:chExt cx="0" cy="0"/>
+        </a:xfrm>
+      </p:grpSpPr>
+      <p:sp>
+        <p:nvSpPr>
+          <p:cNvPr id="2" name="Title 1">
+            <a:extLst>
+              <a:ext uri="{FF2B5EF4-FFF2-40B4-BE49-F238E27FC236}">
+                <a16:creationId xmlns:a16="http://schemas.microsoft.com/office/drawing/2014/main" id="{E791D93C-47E8-4001-9A01-6F0209A03D63}"/>
+              </a:ext>
+            </a:extLst>
+          </p:cNvPr>
+          <p:cNvSpPr>
+            <a:spLocks noGrp="1"/>
+          </p:cNvSpPr>
+          <p:nvPr>
+            <p:ph type="title"/>
+          </p:nvPr>
+        </p:nvSpPr>
+        <p:spPr/>
+        <p:txBody>
+          <a:bodyPr/>
+          <a:lstStyle/>
+          <a:p>
+            <a:endParaRPr lang="pl-PL" dirty="0"/>
+          </a:p>
+        </p:txBody>
+      </p:sp>
+      <p:pic>
+        <p:nvPicPr>
+          <p:cNvPr id="4" name="Content Placeholder 3">
+            <a:extLst>
+              <a:ext uri="{FF2B5EF4-FFF2-40B4-BE49-F238E27FC236}">
+                <a16:creationId xmlns:a16="http://schemas.microsoft.com/office/drawing/2014/main" id="{2583F746-860B-46F3-B5A4-5BDD9F105544}"/>
+              </a:ext>
+            </a:extLst>
+          </p:cNvPr>
+          <p:cNvPicPr>
+            <a:picLocks noGrp="1" noChangeAspect="1"/>
+          </p:cNvPicPr>
+          <p:nvPr>
+            <p:ph idx="1"/>
+          </p:nvPr>
+        </p:nvPicPr>
+        <p:blipFill>
+          <a:blip r:embed="rId3"/>
+          <a:stretch>
+            <a:fillRect/>
+          </a:stretch>
+        </p:blipFill>
+        <p:spPr>
+          <a:xfrm>
+            <a:off x="1519237" y="2763044"/>
+            <a:ext cx="9153525" cy="2886075"/>
+          </a:xfrm>
+          <a:prstGeom prst="rect">
+            <a:avLst/>
+          </a:prstGeom>
+        </p:spPr>
+      </p:pic>
+      <p:sp>
+        <p:nvSpPr>
+          <p:cNvPr id="5" name="Footer Placeholder 4">
+            <a:extLst>
+              <a:ext uri="{FF2B5EF4-FFF2-40B4-BE49-F238E27FC236}">
+                <a16:creationId xmlns:a16="http://schemas.microsoft.com/office/drawing/2014/main" id="{16931B56-37A1-4110-90D7-B88E6A4A53D4}"/>
+              </a:ext>
+            </a:extLst>
+          </p:cNvPr>
+          <p:cNvSpPr>
+            <a:spLocks noGrp="1"/>
+          </p:cNvSpPr>
+          <p:nvPr>
+            <p:ph type="ftr" sz="quarter" idx="11"/>
+          </p:nvPr>
+        </p:nvSpPr>
+        <p:spPr/>
+        <p:txBody>
+          <a:bodyPr/>
+          <a:lstStyle/>
+          <a:p>
+            <a:r>
+              <a:rPr lang="pl-PL"/>
+              <a:t>@maciejwyrodek</a:t>
+            </a:r>
+          </a:p>
+        </p:txBody>
+      </p:sp>
+    </p:spTree>
+    <p:extLst>
+      <p:ext uri="{BB962C8B-B14F-4D97-AF65-F5344CB8AC3E}">
+        <p14:creationId xmlns:p14="http://schemas.microsoft.com/office/powerpoint/2010/main" val="969425584"/>
+      </p:ext>
+    </p:extLst>
+  </p:cSld>
+  <p:clrMapOvr>
+    <a:masterClrMapping/>
+  </p:clrMapOvr>
+</p:sld>
+</file>
+
+<file path=ppt/slides/slide42.xml><?xml version="1.0" encoding="utf-8"?>
+<p:sld xmlns:a="http://schemas.openxmlformats.org/drawingml/2006/main" xmlns:r="http://schemas.openxmlformats.org/officeDocument/2006/relationships" xmlns:p="http://schemas.openxmlformats.org/presentationml/2006/main">
+  <p:cSld>
+    <p:spTree>
+      <p:nvGrpSpPr>
+        <p:cNvPr id="1" name=""/>
+        <p:cNvGrpSpPr/>
+        <p:nvPr/>
+      </p:nvGrpSpPr>
+      <p:grpSpPr>
+        <a:xfrm>
+          <a:off x="0" y="0"/>
+          <a:ext cx="0" cy="0"/>
+          <a:chOff x="0" y="0"/>
+          <a:chExt cx="0" cy="0"/>
+        </a:xfrm>
+      </p:grpSpPr>
+      <p:sp>
+        <p:nvSpPr>
           <p:cNvPr id="2" name="Title 1">
             <a:extLst>
               <a:ext uri="{FF2B5EF4-FFF2-40B4-BE49-F238E27FC236}">
@@ -15604,7 +15861,7 @@
 </p:sld>
 </file>
 
-<file path=ppt/slides/slide41.xml><?xml version="1.0" encoding="utf-8"?>
+<file path=ppt/slides/slide43.xml><?xml version="1.0" encoding="utf-8"?>
 <p:sld xmlns:a="http://schemas.openxmlformats.org/drawingml/2006/main" xmlns:r="http://schemas.openxmlformats.org/officeDocument/2006/relationships" xmlns:p="http://schemas.openxmlformats.org/presentationml/2006/main">
   <p:cSld>
     <p:spTree>
@@ -15761,7 +16018,209 @@
 </p:sld>
 </file>
 
-<file path=ppt/slides/slide42.xml><?xml version="1.0" encoding="utf-8"?>
+<file path=ppt/slides/slide44.xml><?xml version="1.0" encoding="utf-8"?>
+<p:sld xmlns:a="http://schemas.openxmlformats.org/drawingml/2006/main" xmlns:r="http://schemas.openxmlformats.org/officeDocument/2006/relationships" xmlns:p="http://schemas.openxmlformats.org/presentationml/2006/main">
+  <p:cSld>
+    <p:bg>
+      <p:bgPr>
+        <a:solidFill>
+          <a:schemeClr val="bg1"/>
+        </a:solidFill>
+        <a:effectLst/>
+      </p:bgPr>
+    </p:bg>
+    <p:spTree>
+      <p:nvGrpSpPr>
+        <p:cNvPr id="1" name=""/>
+        <p:cNvGrpSpPr/>
+        <p:nvPr/>
+      </p:nvGrpSpPr>
+      <p:grpSpPr>
+        <a:xfrm>
+          <a:off x="0" y="0"/>
+          <a:ext cx="0" cy="0"/>
+          <a:chOff x="0" y="0"/>
+          <a:chExt cx="0" cy="0"/>
+        </a:xfrm>
+      </p:grpSpPr>
+      <p:sp>
+        <p:nvSpPr>
+          <p:cNvPr id="5" name="Title 4">
+            <a:extLst>
+              <a:ext uri="{FF2B5EF4-FFF2-40B4-BE49-F238E27FC236}">
+                <a16:creationId xmlns:a16="http://schemas.microsoft.com/office/drawing/2014/main" id="{0320D63F-9314-4419-9620-14ADF97607E8}"/>
+              </a:ext>
+            </a:extLst>
+          </p:cNvPr>
+          <p:cNvSpPr>
+            <a:spLocks noGrp="1"/>
+          </p:cNvSpPr>
+          <p:nvPr>
+            <p:ph type="ctrTitle"/>
+          </p:nvPr>
+        </p:nvSpPr>
+        <p:spPr>
+          <a:xfrm>
+            <a:off x="4687410" y="1803405"/>
+            <a:ext cx="6132990" cy="1825096"/>
+          </a:xfrm>
+        </p:spPr>
+        <p:txBody>
+          <a:bodyPr>
+            <a:normAutofit/>
+          </a:bodyPr>
+          <a:lstStyle/>
+          <a:p>
+            <a:r>
+              <a:rPr lang="en-US" sz="4200"/>
+              <a:t>Let's measure performance </a:t>
+            </a:r>
+            <a:br>
+              <a:rPr lang="pl-PL" sz="4200"/>
+            </a:br>
+            <a:r>
+              <a:rPr lang="en-US" sz="4200"/>
+              <a:t>one more time!</a:t>
+            </a:r>
+            <a:endParaRPr lang="pl-PL" sz="4200"/>
+          </a:p>
+        </p:txBody>
+      </p:sp>
+      <p:sp>
+        <p:nvSpPr>
+          <p:cNvPr id="6" name="Subtitle 5">
+            <a:extLst>
+              <a:ext uri="{FF2B5EF4-FFF2-40B4-BE49-F238E27FC236}">
+                <a16:creationId xmlns:a16="http://schemas.microsoft.com/office/drawing/2014/main" id="{DB460871-C92A-4F79-A61E-19C0753AE541}"/>
+              </a:ext>
+            </a:extLst>
+          </p:cNvPr>
+          <p:cNvSpPr>
+            <a:spLocks noGrp="1"/>
+          </p:cNvSpPr>
+          <p:nvPr>
+            <p:ph type="subTitle" idx="1"/>
+          </p:nvPr>
+        </p:nvSpPr>
+        <p:spPr>
+          <a:xfrm>
+            <a:off x="4687410" y="3632201"/>
+            <a:ext cx="6132990" cy="685800"/>
+          </a:xfrm>
+        </p:spPr>
+        <p:txBody>
+          <a:bodyPr>
+            <a:normAutofit/>
+          </a:bodyPr>
+          <a:lstStyle/>
+          <a:p>
+            <a:r>
+              <a:rPr lang="en-US" dirty="0"/>
+              <a:t>(but in a less awkward way)</a:t>
+            </a:r>
+            <a:endParaRPr lang="pl-PL" dirty="0"/>
+          </a:p>
+        </p:txBody>
+      </p:sp>
+      <p:pic>
+        <p:nvPicPr>
+          <p:cNvPr id="7" name="Picture 4">
+            <a:extLst>
+              <a:ext uri="{FF2B5EF4-FFF2-40B4-BE49-F238E27FC236}">
+                <a16:creationId xmlns:a16="http://schemas.microsoft.com/office/drawing/2014/main" id="{0954D862-85D5-423B-A978-1895ED27CBCD}"/>
+              </a:ext>
+            </a:extLst>
+          </p:cNvPr>
+          <p:cNvPicPr>
+            <a:picLocks noChangeAspect="1" noChangeArrowheads="1"/>
+          </p:cNvPicPr>
+          <p:nvPr/>
+        </p:nvPicPr>
+        <p:blipFill rotWithShape="1">
+          <a:blip r:embed="rId2">
+            <a:extLst>
+              <a:ext uri="{28A0092B-C50C-407E-A947-70E740481C1C}">
+                <a14:useLocalDpi xmlns:a14="http://schemas.microsoft.com/office/drawing/2010/main" val="0"/>
+              </a:ext>
+            </a:extLst>
+          </a:blip>
+          <a:srcRect r="3" b="3"/>
+          <a:stretch/>
+        </p:blipFill>
+        <p:spPr bwMode="auto">
+          <a:xfrm>
+            <a:off x="1441659" y="1543049"/>
+            <a:ext cx="2662321" cy="2662321"/>
+          </a:xfrm>
+          <a:prstGeom prst="rect">
+            <a:avLst/>
+          </a:prstGeom>
+          <a:noFill/>
+          <a:extLst>
+            <a:ext uri="{909E8E84-426E-40DD-AFC4-6F175D3DCCD1}">
+              <a14:hiddenFill xmlns:a14="http://schemas.microsoft.com/office/drawing/2010/main">
+                <a:solidFill>
+                  <a:srgbClr val="FFFFFF"/>
+                </a:solidFill>
+              </a14:hiddenFill>
+            </a:ext>
+          </a:extLst>
+        </p:spPr>
+      </p:pic>
+      <p:sp>
+        <p:nvSpPr>
+          <p:cNvPr id="4" name="Footer Placeholder 3">
+            <a:extLst>
+              <a:ext uri="{FF2B5EF4-FFF2-40B4-BE49-F238E27FC236}">
+                <a16:creationId xmlns:a16="http://schemas.microsoft.com/office/drawing/2014/main" id="{81A5CC0C-2230-4F29-B0B2-556ED926B200}"/>
+              </a:ext>
+            </a:extLst>
+          </p:cNvPr>
+          <p:cNvSpPr>
+            <a:spLocks noGrp="1"/>
+          </p:cNvSpPr>
+          <p:nvPr>
+            <p:ph type="ftr" sz="quarter" idx="11"/>
+          </p:nvPr>
+        </p:nvSpPr>
+        <p:spPr>
+          <a:xfrm>
+            <a:off x="1371600" y="4323845"/>
+            <a:ext cx="6400800" cy="365125"/>
+          </a:xfrm>
+        </p:spPr>
+        <p:txBody>
+          <a:bodyPr>
+            <a:normAutofit/>
+          </a:bodyPr>
+          <a:lstStyle/>
+          <a:p>
+            <a:pPr>
+              <a:spcAft>
+                <a:spcPts val="600"/>
+              </a:spcAft>
+            </a:pPr>
+            <a:r>
+              <a:rPr lang="pl-PL"/>
+              <a:t>@maciejwyrodek</a:t>
+            </a:r>
+          </a:p>
+        </p:txBody>
+      </p:sp>
+    </p:spTree>
+    <p:extLst>
+      <p:ext uri="{BB962C8B-B14F-4D97-AF65-F5344CB8AC3E}">
+        <p14:creationId xmlns:p14="http://schemas.microsoft.com/office/powerpoint/2010/main" val="2764886343"/>
+      </p:ext>
+    </p:extLst>
+  </p:cSld>
+  <p:clrMapOvr>
+    <a:masterClrMapping/>
+  </p:clrMapOvr>
+</p:sld>
+</file>
+
+<file path=ppt/slides/slide45.xml><?xml version="1.0" encoding="utf-8"?>
 <p:sld xmlns:a="http://schemas.openxmlformats.org/drawingml/2006/main" xmlns:r="http://schemas.openxmlformats.org/officeDocument/2006/relationships" xmlns:p="http://schemas.openxmlformats.org/presentationml/2006/main">
   <p:cSld>
     <p:bg>
@@ -16174,1259 +16633,6 @@
 </p:sld>
 </file>
 
-<file path=ppt/slides/slide43.xml><?xml version="1.0" encoding="utf-8"?>
-<p:sld xmlns:a="http://schemas.openxmlformats.org/drawingml/2006/main" xmlns:r="http://schemas.openxmlformats.org/officeDocument/2006/relationships" xmlns:p="http://schemas.openxmlformats.org/presentationml/2006/main">
-  <p:cSld>
-    <p:bg>
-      <p:bgPr>
-        <a:solidFill>
-          <a:schemeClr val="bg1"/>
-        </a:solidFill>
-        <a:effectLst/>
-      </p:bgPr>
-    </p:bg>
-    <p:spTree>
-      <p:nvGrpSpPr>
-        <p:cNvPr id="1" name=""/>
-        <p:cNvGrpSpPr/>
-        <p:nvPr/>
-      </p:nvGrpSpPr>
-      <p:grpSpPr>
-        <a:xfrm>
-          <a:off x="0" y="0"/>
-          <a:ext cx="0" cy="0"/>
-          <a:chOff x="0" y="0"/>
-          <a:chExt cx="0" cy="0"/>
-        </a:xfrm>
-      </p:grpSpPr>
-      <p:pic>
-        <p:nvPicPr>
-          <p:cNvPr id="71" name="Picture 70">
-            <a:extLst>
-              <a:ext uri="{FF2B5EF4-FFF2-40B4-BE49-F238E27FC236}">
-                <a16:creationId xmlns:a16="http://schemas.microsoft.com/office/drawing/2014/main" id="{C413590B-CB36-47BC-B705-69813F7B5F6F}"/>
-              </a:ext>
-              <a:ext uri="{C183D7F6-B498-43B3-948B-1728B52AA6E4}">
-                <adec:decorative xmlns:adec="http://schemas.microsoft.com/office/drawing/2017/decorative" val="1"/>
-              </a:ext>
-            </a:extLst>
-          </p:cNvPr>
-          <p:cNvPicPr>
-            <a:picLocks noGrp="1" noRot="1" noChangeAspect="1" noMove="1" noResize="1" noEditPoints="1" noAdjustHandles="1" noChangeArrowheads="1" noChangeShapeType="1" noCrop="1"/>
-          </p:cNvPicPr>
-          <p:nvPr>
-            <p:extLst>
-              <p:ext uri="{386F3935-93C4-4BCD-93E2-E3B085C9AB24}">
-                <p16:designElem xmlns:p16="http://schemas.microsoft.com/office/powerpoint/2015/main" val="1"/>
-              </p:ext>
-            </p:extLst>
-          </p:nvPr>
-        </p:nvPicPr>
-        <p:blipFill>
-          <a:blip r:embed="rId2">
-            <a:extLst>
-              <a:ext uri="{28A0092B-C50C-407E-A947-70E740481C1C}">
-                <a14:useLocalDpi xmlns:a14="http://schemas.microsoft.com/office/drawing/2010/main" val="0"/>
-              </a:ext>
-            </a:extLst>
-          </a:blip>
-          <a:stretch>
-            <a:fillRect/>
-          </a:stretch>
-        </p:blipFill>
-        <p:spPr>
-          <a:xfrm>
-            <a:off x="0" y="0"/>
-            <a:ext cx="12192000" cy="1441450"/>
-          </a:xfrm>
-          <a:prstGeom prst="rect">
-            <a:avLst/>
-          </a:prstGeom>
-        </p:spPr>
-      </p:pic>
-      <p:pic>
-        <p:nvPicPr>
-          <p:cNvPr id="73" name="Picture 72">
-            <a:extLst>
-              <a:ext uri="{FF2B5EF4-FFF2-40B4-BE49-F238E27FC236}">
-                <a16:creationId xmlns:a16="http://schemas.microsoft.com/office/drawing/2014/main" id="{D676F4B9-1E76-49E4-8A47-FBDCE00D43AC}"/>
-              </a:ext>
-              <a:ext uri="{C183D7F6-B498-43B3-948B-1728B52AA6E4}">
-                <adec:decorative xmlns:adec="http://schemas.microsoft.com/office/drawing/2017/decorative" val="1"/>
-              </a:ext>
-            </a:extLst>
-          </p:cNvPr>
-          <p:cNvPicPr>
-            <a:picLocks noGrp="1" noRot="1" noChangeAspect="1" noMove="1" noResize="1" noEditPoints="1" noAdjustHandles="1" noChangeArrowheads="1" noChangeShapeType="1" noCrop="1"/>
-          </p:cNvPicPr>
-          <p:nvPr>
-            <p:extLst>
-              <p:ext uri="{386F3935-93C4-4BCD-93E2-E3B085C9AB24}">
-                <p16:designElem xmlns:p16="http://schemas.microsoft.com/office/powerpoint/2015/main" val="1"/>
-              </p:ext>
-            </p:extLst>
-          </p:nvPr>
-        </p:nvPicPr>
-        <p:blipFill>
-          <a:blip r:embed="rId3">
-            <a:extLst>
-              <a:ext uri="{28A0092B-C50C-407E-A947-70E740481C1C}">
-                <a14:useLocalDpi xmlns:a14="http://schemas.microsoft.com/office/drawing/2010/main" val="0"/>
-              </a:ext>
-            </a:extLst>
-          </a:blip>
-          <a:stretch>
-            <a:fillRect/>
-          </a:stretch>
-        </p:blipFill>
-        <p:spPr>
-          <a:xfrm>
-            <a:off x="0" y="4375150"/>
-            <a:ext cx="12192000" cy="2482850"/>
-          </a:xfrm>
-          <a:prstGeom prst="rect">
-            <a:avLst/>
-          </a:prstGeom>
-        </p:spPr>
-      </p:pic>
-      <p:sp>
-        <p:nvSpPr>
-          <p:cNvPr id="2" name="Title 1">
-            <a:extLst>
-              <a:ext uri="{FF2B5EF4-FFF2-40B4-BE49-F238E27FC236}">
-                <a16:creationId xmlns:a16="http://schemas.microsoft.com/office/drawing/2014/main" id="{7B20C169-D59F-4358-8EBC-912BE5EB05CE}"/>
-              </a:ext>
-            </a:extLst>
-          </p:cNvPr>
-          <p:cNvSpPr>
-            <a:spLocks noGrp="1"/>
-          </p:cNvSpPr>
-          <p:nvPr>
-            <p:ph type="title"/>
-          </p:nvPr>
-        </p:nvSpPr>
-        <p:spPr>
-          <a:xfrm>
-            <a:off x="8419340" y="673240"/>
-            <a:ext cx="3148461" cy="3446373"/>
-          </a:xfrm>
-          <a:noFill/>
-          <a:ln w="19050">
-            <a:noFill/>
-            <a:prstDash val="dash"/>
-          </a:ln>
-        </p:spPr>
-        <p:txBody>
-          <a:bodyPr vert="horz" lIns="91440" tIns="45720" rIns="91440" bIns="45720" rtlCol="0" anchor="b">
-            <a:normAutofit/>
-          </a:bodyPr>
-          <a:lstStyle/>
-          <a:p>
-            <a:pPr algn="l"/>
-            <a:r>
-              <a:rPr lang="en-US" sz="4800"/>
-              <a:t>Thank YOU</a:t>
-            </a:r>
-          </a:p>
-        </p:txBody>
-      </p:sp>
-      <p:sp>
-        <p:nvSpPr>
-          <p:cNvPr id="3" name="Content Placeholder 2">
-            <a:extLst>
-              <a:ext uri="{FF2B5EF4-FFF2-40B4-BE49-F238E27FC236}">
-                <a16:creationId xmlns:a16="http://schemas.microsoft.com/office/drawing/2014/main" id="{DB75D01F-4DF6-443C-B0F7-C44E7CA33BDA}"/>
-              </a:ext>
-            </a:extLst>
-          </p:cNvPr>
-          <p:cNvSpPr>
-            <a:spLocks noGrp="1"/>
-          </p:cNvSpPr>
-          <p:nvPr>
-            <p:ph idx="1"/>
-          </p:nvPr>
-        </p:nvSpPr>
-        <p:spPr>
-          <a:xfrm>
-            <a:off x="8460445" y="4133681"/>
-            <a:ext cx="3148460" cy="2058765"/>
-          </a:xfrm>
-          <a:noFill/>
-          <a:ln w="19050">
-            <a:noFill/>
-            <a:prstDash val="dash"/>
-          </a:ln>
-        </p:spPr>
-        <p:txBody>
-          <a:bodyPr vert="horz" lIns="91440" tIns="45720" rIns="91440" bIns="45720" rtlCol="0">
-            <a:normAutofit/>
-          </a:bodyPr>
-          <a:lstStyle/>
-          <a:p>
-            <a:pPr marL="0" indent="0">
-              <a:buNone/>
-            </a:pPr>
-            <a:r>
-              <a:rPr lang="pl-PL" sz="2000" dirty="0"/>
-              <a:t>We </a:t>
-            </a:r>
-            <a:r>
-              <a:rPr lang="pl-PL" sz="2000" dirty="0" err="1"/>
-              <a:t>are</a:t>
-            </a:r>
-            <a:r>
-              <a:rPr lang="pl-PL" sz="2000" dirty="0"/>
-              <a:t> </a:t>
-            </a:r>
-            <a:r>
-              <a:rPr lang="pl-PL" sz="2000" dirty="0" err="1"/>
-              <a:t>Hiring</a:t>
-            </a:r>
-            <a:r>
-              <a:rPr lang="pl-PL" sz="2000" dirty="0"/>
-              <a:t>!</a:t>
-            </a:r>
-            <a:endParaRPr lang="en-US" sz="2000" dirty="0"/>
-          </a:p>
-        </p:txBody>
-      </p:sp>
-      <p:sp>
-        <p:nvSpPr>
-          <p:cNvPr id="75" name="Rectangle 74">
-            <a:extLst>
-              <a:ext uri="{FF2B5EF4-FFF2-40B4-BE49-F238E27FC236}">
-                <a16:creationId xmlns:a16="http://schemas.microsoft.com/office/drawing/2014/main" id="{FF8A0554-081B-4FCD-B8AC-1F826E38FF9A}"/>
-              </a:ext>
-              <a:ext uri="{C183D7F6-B498-43B3-948B-1728B52AA6E4}">
-                <adec:decorative xmlns:adec="http://schemas.microsoft.com/office/drawing/2017/decorative" val="1"/>
-              </a:ext>
-            </a:extLst>
-          </p:cNvPr>
-          <p:cNvSpPr>
-            <a:spLocks noGrp="1" noRot="1" noChangeAspect="1" noMove="1" noResize="1" noEditPoints="1" noAdjustHandles="1" noChangeArrowheads="1" noChangeShapeType="1" noTextEdit="1"/>
-          </p:cNvSpPr>
-          <p:nvPr>
-            <p:extLst>
-              <p:ext uri="{386F3935-93C4-4BCD-93E2-E3B085C9AB24}">
-                <p16:designElem xmlns:p16="http://schemas.microsoft.com/office/powerpoint/2015/main" val="1"/>
-              </p:ext>
-            </p:extLst>
-          </p:nvPr>
-        </p:nvSpPr>
-        <p:spPr>
-          <a:xfrm>
-            <a:off x="7946782" y="-1"/>
-            <a:ext cx="4245218" cy="536715"/>
-          </a:xfrm>
-          <a:prstGeom prst="rect">
-            <a:avLst/>
-          </a:prstGeom>
-          <a:solidFill>
-            <a:schemeClr val="bg1"/>
-          </a:solidFill>
-          <a:ln>
-            <a:noFill/>
-          </a:ln>
-        </p:spPr>
-        <p:style>
-          <a:lnRef idx="2">
-            <a:schemeClr val="accent1">
-              <a:shade val="50000"/>
-            </a:schemeClr>
-          </a:lnRef>
-          <a:fillRef idx="1">
-            <a:schemeClr val="accent1"/>
-          </a:fillRef>
-          <a:effectRef idx="0">
-            <a:schemeClr val="accent1"/>
-          </a:effectRef>
-          <a:fontRef idx="minor">
-            <a:schemeClr val="lt1"/>
-          </a:fontRef>
-        </p:style>
-        <p:txBody>
-          <a:bodyPr rtlCol="0" anchor="ctr"/>
-          <a:lstStyle/>
-          <a:p>
-            <a:pPr algn="ctr"/>
-            <a:endParaRPr lang="en-US"/>
-          </a:p>
-        </p:txBody>
-      </p:sp>
-      <p:sp>
-        <p:nvSpPr>
-          <p:cNvPr id="77" name="Rectangle 76">
-            <a:extLst>
-              <a:ext uri="{FF2B5EF4-FFF2-40B4-BE49-F238E27FC236}">
-                <a16:creationId xmlns:a16="http://schemas.microsoft.com/office/drawing/2014/main" id="{406FFEE2-58A0-44A3-9892-24602A68808B}"/>
-              </a:ext>
-              <a:ext uri="{C183D7F6-B498-43B3-948B-1728B52AA6E4}">
-                <adec:decorative xmlns:adec="http://schemas.microsoft.com/office/drawing/2017/decorative" val="1"/>
-              </a:ext>
-            </a:extLst>
-          </p:cNvPr>
-          <p:cNvSpPr>
-            <a:spLocks noGrp="1" noRot="1" noChangeAspect="1" noMove="1" noResize="1" noEditPoints="1" noAdjustHandles="1" noChangeArrowheads="1" noChangeShapeType="1" noTextEdit="1"/>
-          </p:cNvSpPr>
-          <p:nvPr>
-            <p:extLst>
-              <p:ext uri="{386F3935-93C4-4BCD-93E2-E3B085C9AB24}">
-                <p16:designElem xmlns:p16="http://schemas.microsoft.com/office/powerpoint/2015/main" val="1"/>
-              </p:ext>
-            </p:extLst>
-          </p:nvPr>
-        </p:nvSpPr>
-        <p:spPr>
-          <a:xfrm>
-            <a:off x="0" y="0"/>
-            <a:ext cx="7961243" cy="6858000"/>
-          </a:xfrm>
-          <a:prstGeom prst="rect">
-            <a:avLst/>
-          </a:prstGeom>
-          <a:solidFill>
-            <a:schemeClr val="bg1"/>
-          </a:solidFill>
-          <a:ln>
-            <a:noFill/>
-          </a:ln>
-        </p:spPr>
-        <p:style>
-          <a:lnRef idx="2">
-            <a:schemeClr val="accent1">
-              <a:shade val="50000"/>
-            </a:schemeClr>
-          </a:lnRef>
-          <a:fillRef idx="1">
-            <a:schemeClr val="accent1"/>
-          </a:fillRef>
-          <a:effectRef idx="0">
-            <a:schemeClr val="accent1"/>
-          </a:effectRef>
-          <a:fontRef idx="minor">
-            <a:schemeClr val="lt1"/>
-          </a:fontRef>
-        </p:style>
-        <p:txBody>
-          <a:bodyPr rtlCol="0" anchor="ctr"/>
-          <a:lstStyle/>
-          <a:p>
-            <a:pPr algn="ctr"/>
-            <a:endParaRPr lang="en-US"/>
-          </a:p>
-        </p:txBody>
-      </p:sp>
-      <p:sp>
-        <p:nvSpPr>
-          <p:cNvPr id="79" name="Rectangle 78">
-            <a:extLst>
-              <a:ext uri="{FF2B5EF4-FFF2-40B4-BE49-F238E27FC236}">
-                <a16:creationId xmlns:a16="http://schemas.microsoft.com/office/drawing/2014/main" id="{69CA411D-D82A-4BF1-878C-4C25F8C77A6C}"/>
-              </a:ext>
-              <a:ext uri="{C183D7F6-B498-43B3-948B-1728B52AA6E4}">
-                <adec:decorative xmlns:adec="http://schemas.microsoft.com/office/drawing/2017/decorative" val="1"/>
-              </a:ext>
-            </a:extLst>
-          </p:cNvPr>
-          <p:cNvSpPr>
-            <a:spLocks noGrp="1" noRot="1" noChangeAspect="1" noMove="1" noResize="1" noEditPoints="1" noAdjustHandles="1" noChangeArrowheads="1" noChangeShapeType="1" noTextEdit="1"/>
-          </p:cNvSpPr>
-          <p:nvPr>
-            <p:extLst>
-              <p:ext uri="{386F3935-93C4-4BCD-93E2-E3B085C9AB24}">
-                <p16:designElem xmlns:p16="http://schemas.microsoft.com/office/powerpoint/2015/main" val="1"/>
-              </p:ext>
-            </p:extLst>
-          </p:nvPr>
-        </p:nvSpPr>
-        <p:spPr>
-          <a:xfrm>
-            <a:off x="458097" y="488844"/>
-            <a:ext cx="3731895" cy="3526040"/>
-          </a:xfrm>
-          <a:prstGeom prst="rect">
-            <a:avLst/>
-          </a:prstGeom>
-          <a:solidFill>
-            <a:srgbClr val="FFFFFF"/>
-          </a:solidFill>
-          <a:ln>
-            <a:noFill/>
-          </a:ln>
-        </p:spPr>
-        <p:style>
-          <a:lnRef idx="2">
-            <a:schemeClr val="accent1">
-              <a:shade val="50000"/>
-            </a:schemeClr>
-          </a:lnRef>
-          <a:fillRef idx="1">
-            <a:schemeClr val="accent1"/>
-          </a:fillRef>
-          <a:effectRef idx="0">
-            <a:schemeClr val="accent1"/>
-          </a:effectRef>
-          <a:fontRef idx="minor">
-            <a:schemeClr val="lt1"/>
-          </a:fontRef>
-        </p:style>
-        <p:txBody>
-          <a:bodyPr rtlCol="0" anchor="ctr"/>
-          <a:lstStyle/>
-          <a:p>
-            <a:pPr algn="ctr"/>
-            <a:endParaRPr lang="en-US"/>
-          </a:p>
-        </p:txBody>
-      </p:sp>
-      <p:pic>
-        <p:nvPicPr>
-          <p:cNvPr id="6" name="Picture 2" descr="About Us | Digital Transformation Specialists ...">
-            <a:extLst>
-              <a:ext uri="{FF2B5EF4-FFF2-40B4-BE49-F238E27FC236}">
-                <a16:creationId xmlns:a16="http://schemas.microsoft.com/office/drawing/2014/main" id="{7F0E28A4-749D-461C-9C95-FCC1184EA10F}"/>
-              </a:ext>
-            </a:extLst>
-          </p:cNvPr>
-          <p:cNvPicPr>
-            <a:picLocks noChangeAspect="1" noChangeArrowheads="1"/>
-          </p:cNvPicPr>
-          <p:nvPr/>
-        </p:nvPicPr>
-        <p:blipFill>
-          <a:blip r:embed="rId4">
-            <a:extLst>
-              <a:ext uri="{28A0092B-C50C-407E-A947-70E740481C1C}">
-                <a14:useLocalDpi xmlns:a14="http://schemas.microsoft.com/office/drawing/2010/main" val="0"/>
-              </a:ext>
-            </a:extLst>
-          </a:blip>
-          <a:stretch>
-            <a:fillRect/>
-          </a:stretch>
-        </p:blipFill>
-        <p:spPr bwMode="auto">
-          <a:xfrm>
-            <a:off x="618964" y="1357537"/>
-            <a:ext cx="3404405" cy="1787312"/>
-          </a:xfrm>
-          <a:prstGeom prst="rect">
-            <a:avLst/>
-          </a:prstGeom>
-          <a:extLst>
-            <a:ext uri="{909E8E84-426E-40DD-AFC4-6F175D3DCCD1}">
-              <a14:hiddenFill xmlns:a14="http://schemas.microsoft.com/office/drawing/2010/main">
-                <a:solidFill>
-                  <a:srgbClr val="FFFFFF"/>
-                </a:solidFill>
-              </a14:hiddenFill>
-            </a:ext>
-          </a:extLst>
-        </p:spPr>
-      </p:pic>
-      <p:sp>
-        <p:nvSpPr>
-          <p:cNvPr id="81" name="Round Single Corner Rectangle 15">
-            <a:extLst>
-              <a:ext uri="{FF2B5EF4-FFF2-40B4-BE49-F238E27FC236}">
-                <a16:creationId xmlns:a16="http://schemas.microsoft.com/office/drawing/2014/main" id="{C9BB7D94-2C4A-4F0F-8933-E3276A89936E}"/>
-              </a:ext>
-              <a:ext uri="{C183D7F6-B498-43B3-948B-1728B52AA6E4}">
-                <adec:decorative xmlns:adec="http://schemas.microsoft.com/office/drawing/2017/decorative" val="1"/>
-              </a:ext>
-            </a:extLst>
-          </p:cNvPr>
-          <p:cNvSpPr>
-            <a:spLocks noGrp="1" noRot="1" noChangeAspect="1" noMove="1" noResize="1" noEditPoints="1" noAdjustHandles="1" noChangeArrowheads="1" noChangeShapeType="1" noTextEdit="1"/>
-          </p:cNvSpPr>
-          <p:nvPr>
-            <p:extLst>
-              <p:ext uri="{386F3935-93C4-4BCD-93E2-E3B085C9AB24}">
-                <p16:designElem xmlns:p16="http://schemas.microsoft.com/office/powerpoint/2015/main" val="1"/>
-              </p:ext>
-            </p:extLst>
-          </p:nvPr>
-        </p:nvSpPr>
-        <p:spPr>
-          <a:xfrm>
-            <a:off x="4338650" y="604977"/>
-            <a:ext cx="1998359" cy="2223847"/>
-          </a:xfrm>
-          <a:prstGeom prst="round1Rect">
-            <a:avLst>
-              <a:gd name="adj" fmla="val 11295"/>
-            </a:avLst>
-          </a:prstGeom>
-          <a:solidFill>
-            <a:schemeClr val="accent6">
-              <a:alpha val="80000"/>
-            </a:schemeClr>
-          </a:solidFill>
-          <a:ln>
-            <a:noFill/>
-          </a:ln>
-        </p:spPr>
-        <p:style>
-          <a:lnRef idx="2">
-            <a:schemeClr val="accent1">
-              <a:shade val="50000"/>
-            </a:schemeClr>
-          </a:lnRef>
-          <a:fillRef idx="1">
-            <a:schemeClr val="accent1"/>
-          </a:fillRef>
-          <a:effectRef idx="0">
-            <a:schemeClr val="accent1"/>
-          </a:effectRef>
-          <a:fontRef idx="minor">
-            <a:schemeClr val="lt1"/>
-          </a:fontRef>
-        </p:style>
-        <p:txBody>
-          <a:bodyPr rtlCol="0" anchor="ctr"/>
-          <a:lstStyle/>
-          <a:p>
-            <a:pPr algn="ctr"/>
-            <a:endParaRPr lang="en-US"/>
-          </a:p>
-        </p:txBody>
-      </p:sp>
-      <p:sp>
-        <p:nvSpPr>
-          <p:cNvPr id="83" name="Round Single Corner Rectangle 14">
-            <a:extLst>
-              <a:ext uri="{FF2B5EF4-FFF2-40B4-BE49-F238E27FC236}">
-                <a16:creationId xmlns:a16="http://schemas.microsoft.com/office/drawing/2014/main" id="{2C166329-A912-4CA1-A632-89563D6609AA}"/>
-              </a:ext>
-              <a:ext uri="{C183D7F6-B498-43B3-948B-1728B52AA6E4}">
-                <adec:decorative xmlns:adec="http://schemas.microsoft.com/office/drawing/2017/decorative" val="1"/>
-              </a:ext>
-            </a:extLst>
-          </p:cNvPr>
-          <p:cNvSpPr>
-            <a:spLocks noGrp="1" noRot="1" noChangeAspect="1" noMove="1" noResize="1" noEditPoints="1" noAdjustHandles="1" noChangeArrowheads="1" noChangeShapeType="1" noTextEdit="1"/>
-          </p:cNvSpPr>
-          <p:nvPr>
-            <p:extLst>
-              <p:ext uri="{386F3935-93C4-4BCD-93E2-E3B085C9AB24}">
-                <p16:designElem xmlns:p16="http://schemas.microsoft.com/office/powerpoint/2015/main" val="1"/>
-              </p:ext>
-            </p:extLst>
-          </p:nvPr>
-        </p:nvSpPr>
-        <p:spPr>
-          <a:xfrm flipH="1" flipV="1">
-            <a:off x="1769673" y="4118455"/>
-            <a:ext cx="2417253" cy="1840846"/>
-          </a:xfrm>
-          <a:prstGeom prst="round1Rect">
-            <a:avLst>
-              <a:gd name="adj" fmla="val 11295"/>
-            </a:avLst>
-          </a:prstGeom>
-          <a:solidFill>
-            <a:schemeClr val="accent5">
-              <a:alpha val="70000"/>
-            </a:schemeClr>
-          </a:solidFill>
-          <a:ln>
-            <a:noFill/>
-          </a:ln>
-        </p:spPr>
-        <p:style>
-          <a:lnRef idx="2">
-            <a:schemeClr val="accent1">
-              <a:shade val="50000"/>
-            </a:schemeClr>
-          </a:lnRef>
-          <a:fillRef idx="1">
-            <a:schemeClr val="accent1"/>
-          </a:fillRef>
-          <a:effectRef idx="0">
-            <a:schemeClr val="accent1"/>
-          </a:effectRef>
-          <a:fontRef idx="minor">
-            <a:schemeClr val="lt1"/>
-          </a:fontRef>
-        </p:style>
-        <p:txBody>
-          <a:bodyPr rtlCol="0" anchor="ctr"/>
-          <a:lstStyle/>
-          <a:p>
-            <a:pPr algn="ctr"/>
-            <a:endParaRPr lang="en-US"/>
-          </a:p>
-        </p:txBody>
-      </p:sp>
-      <p:sp>
-        <p:nvSpPr>
-          <p:cNvPr id="4" name="Footer Placeholder 3">
-            <a:extLst>
-              <a:ext uri="{FF2B5EF4-FFF2-40B4-BE49-F238E27FC236}">
-                <a16:creationId xmlns:a16="http://schemas.microsoft.com/office/drawing/2014/main" id="{C854D22A-7BF5-41C8-BB54-AA7A6459DA5A}"/>
-              </a:ext>
-            </a:extLst>
-          </p:cNvPr>
-          <p:cNvSpPr>
-            <a:spLocks noGrp="1"/>
-          </p:cNvSpPr>
-          <p:nvPr>
-            <p:ph type="ftr" sz="quarter" idx="11"/>
-          </p:nvPr>
-        </p:nvSpPr>
-        <p:spPr>
-          <a:xfrm>
-            <a:off x="700133" y="6321321"/>
-            <a:ext cx="6400800" cy="365125"/>
-          </a:xfrm>
-        </p:spPr>
-        <p:txBody>
-          <a:bodyPr vert="horz" lIns="91440" tIns="45720" rIns="91440" bIns="45720" rtlCol="0" anchor="ctr">
-            <a:normAutofit/>
-          </a:bodyPr>
-          <a:lstStyle/>
-          <a:p>
-            <a:pPr>
-              <a:spcAft>
-                <a:spcPts val="600"/>
-              </a:spcAft>
-            </a:pPr>
-            <a:r>
-              <a:rPr lang="en-US">
-                <a:solidFill>
-                  <a:srgbClr val="FFFFFF"/>
-                </a:solidFill>
-              </a:rPr>
-              <a:t>@maciejwyrodek</a:t>
-            </a:r>
-          </a:p>
-        </p:txBody>
-      </p:sp>
-      <p:sp>
-        <p:nvSpPr>
-          <p:cNvPr id="85" name="Rectangle 84">
-            <a:extLst>
-              <a:ext uri="{FF2B5EF4-FFF2-40B4-BE49-F238E27FC236}">
-                <a16:creationId xmlns:a16="http://schemas.microsoft.com/office/drawing/2014/main" id="{CFB54679-12EF-4E3F-B1F8-3750B8BD1934}"/>
-              </a:ext>
-              <a:ext uri="{C183D7F6-B498-43B3-948B-1728B52AA6E4}">
-                <adec:decorative xmlns:adec="http://schemas.microsoft.com/office/drawing/2017/decorative" val="1"/>
-              </a:ext>
-            </a:extLst>
-          </p:cNvPr>
-          <p:cNvSpPr>
-            <a:spLocks noGrp="1" noRot="1" noChangeAspect="1" noMove="1" noResize="1" noEditPoints="1" noAdjustHandles="1" noChangeArrowheads="1" noChangeShapeType="1" noTextEdit="1"/>
-          </p:cNvSpPr>
-          <p:nvPr>
-            <p:extLst>
-              <p:ext uri="{386F3935-93C4-4BCD-93E2-E3B085C9AB24}">
-                <p16:designElem xmlns:p16="http://schemas.microsoft.com/office/powerpoint/2015/main" val="1"/>
-              </p:ext>
-            </p:extLst>
-          </p:nvPr>
-        </p:nvSpPr>
-        <p:spPr>
-          <a:xfrm>
-            <a:off x="4347795" y="2989690"/>
-            <a:ext cx="3023953" cy="3388926"/>
-          </a:xfrm>
-          <a:prstGeom prst="rect">
-            <a:avLst/>
-          </a:prstGeom>
-          <a:solidFill>
-            <a:srgbClr val="FFFFFF"/>
-          </a:solidFill>
-          <a:ln>
-            <a:noFill/>
-          </a:ln>
-        </p:spPr>
-        <p:style>
-          <a:lnRef idx="2">
-            <a:schemeClr val="accent1">
-              <a:shade val="50000"/>
-            </a:schemeClr>
-          </a:lnRef>
-          <a:fillRef idx="1">
-            <a:schemeClr val="accent1"/>
-          </a:fillRef>
-          <a:effectRef idx="0">
-            <a:schemeClr val="accent1"/>
-          </a:effectRef>
-          <a:fontRef idx="minor">
-            <a:schemeClr val="lt1"/>
-          </a:fontRef>
-        </p:style>
-        <p:txBody>
-          <a:bodyPr rtlCol="0" anchor="ctr"/>
-          <a:lstStyle/>
-          <a:p>
-            <a:pPr algn="ctr"/>
-            <a:endParaRPr lang="en-US"/>
-          </a:p>
-        </p:txBody>
-      </p:sp>
-      <p:pic>
-        <p:nvPicPr>
-          <p:cNvPr id="1026" name="Picture 2">
-            <a:extLst>
-              <a:ext uri="{FF2B5EF4-FFF2-40B4-BE49-F238E27FC236}">
-                <a16:creationId xmlns:a16="http://schemas.microsoft.com/office/drawing/2014/main" id="{C118FBEE-15B9-4F6A-94A2-9FDFEDE84F99}"/>
-              </a:ext>
-            </a:extLst>
-          </p:cNvPr>
-          <p:cNvPicPr>
-            <a:picLocks noChangeAspect="1" noChangeArrowheads="1"/>
-          </p:cNvPicPr>
-          <p:nvPr/>
-        </p:nvPicPr>
-        <p:blipFill>
-          <a:blip r:embed="rId5">
-            <a:extLst>
-              <a:ext uri="{28A0092B-C50C-407E-A947-70E740481C1C}">
-                <a14:useLocalDpi xmlns:a14="http://schemas.microsoft.com/office/drawing/2010/main" val="0"/>
-              </a:ext>
-            </a:extLst>
-          </a:blip>
-          <a:stretch>
-            <a:fillRect/>
-          </a:stretch>
-        </p:blipFill>
-        <p:spPr bwMode="auto">
-          <a:xfrm>
-            <a:off x="4507316" y="3303816"/>
-            <a:ext cx="2704909" cy="2704909"/>
-          </a:xfrm>
-          <a:prstGeom prst="rect">
-            <a:avLst/>
-          </a:prstGeom>
-          <a:noFill/>
-          <a:extLst>
-            <a:ext uri="{909E8E84-426E-40DD-AFC4-6F175D3DCCD1}">
-              <a14:hiddenFill xmlns:a14="http://schemas.microsoft.com/office/drawing/2010/main">
-                <a:solidFill>
-                  <a:srgbClr val="FFFFFF"/>
-                </a:solidFill>
-              </a14:hiddenFill>
-            </a:ext>
-          </a:extLst>
-        </p:spPr>
-      </p:pic>
-    </p:spTree>
-    <p:extLst>
-      <p:ext uri="{BB962C8B-B14F-4D97-AF65-F5344CB8AC3E}">
-        <p14:creationId xmlns:p14="http://schemas.microsoft.com/office/powerpoint/2010/main" val="4233536118"/>
-      </p:ext>
-    </p:extLst>
-  </p:cSld>
-  <p:clrMapOvr>
-    <a:masterClrMapping/>
-  </p:clrMapOvr>
-</p:sld>
-</file>
-
-<file path=ppt/slides/slide44.xml><?xml version="1.0" encoding="utf-8"?>
-<p:sld xmlns:a="http://schemas.openxmlformats.org/drawingml/2006/main" xmlns:r="http://schemas.openxmlformats.org/officeDocument/2006/relationships" xmlns:p="http://schemas.openxmlformats.org/presentationml/2006/main">
-  <p:cSld>
-    <p:spTree>
-      <p:nvGrpSpPr>
-        <p:cNvPr id="1" name=""/>
-        <p:cNvGrpSpPr/>
-        <p:nvPr/>
-      </p:nvGrpSpPr>
-      <p:grpSpPr>
-        <a:xfrm>
-          <a:off x="0" y="0"/>
-          <a:ext cx="0" cy="0"/>
-          <a:chOff x="0" y="0"/>
-          <a:chExt cx="0" cy="0"/>
-        </a:xfrm>
-      </p:grpSpPr>
-      <p:sp>
-        <p:nvSpPr>
-          <p:cNvPr id="2" name="Title 1">
-            <a:extLst>
-              <a:ext uri="{FF2B5EF4-FFF2-40B4-BE49-F238E27FC236}">
-                <a16:creationId xmlns:a16="http://schemas.microsoft.com/office/drawing/2014/main" id="{680B92B4-F66D-458B-B3C1-CD182E40FF9D}"/>
-              </a:ext>
-            </a:extLst>
-          </p:cNvPr>
-          <p:cNvSpPr>
-            <a:spLocks noGrp="1"/>
-          </p:cNvSpPr>
-          <p:nvPr>
-            <p:ph type="title"/>
-          </p:nvPr>
-        </p:nvSpPr>
-        <p:spPr/>
-        <p:txBody>
-          <a:bodyPr/>
-          <a:lstStyle/>
-          <a:p>
-            <a:r>
-              <a:rPr lang="pl-PL" dirty="0" err="1"/>
-              <a:t>Sources</a:t>
-            </a:r>
-            <a:endParaRPr lang="pl-PL" dirty="0"/>
-          </a:p>
-        </p:txBody>
-      </p:sp>
-      <p:sp>
-        <p:nvSpPr>
-          <p:cNvPr id="3" name="Content Placeholder 2">
-            <a:extLst>
-              <a:ext uri="{FF2B5EF4-FFF2-40B4-BE49-F238E27FC236}">
-                <a16:creationId xmlns:a16="http://schemas.microsoft.com/office/drawing/2014/main" id="{FF2E289B-87C9-4151-966F-BD90991CE5C2}"/>
-              </a:ext>
-            </a:extLst>
-          </p:cNvPr>
-          <p:cNvSpPr>
-            <a:spLocks noGrp="1"/>
-          </p:cNvSpPr>
-          <p:nvPr>
-            <p:ph sz="half" idx="1"/>
-          </p:nvPr>
-        </p:nvSpPr>
-        <p:spPr/>
-        <p:txBody>
-          <a:bodyPr>
-            <a:normAutofit/>
-          </a:bodyPr>
-          <a:lstStyle/>
-          <a:p>
-            <a:pPr marL="0" indent="0">
-              <a:buNone/>
-            </a:pPr>
-            <a:r>
-              <a:rPr lang="pl-PL" dirty="0"/>
-              <a:t>Test </a:t>
-            </a:r>
-            <a:r>
-              <a:rPr lang="pl-PL" dirty="0" err="1"/>
-              <a:t>Doubles</a:t>
-            </a:r>
-            <a:r>
-              <a:rPr lang="pl-PL" dirty="0"/>
-              <a:t>:</a:t>
-            </a:r>
-          </a:p>
-          <a:p>
-            <a:r>
-              <a:rPr lang="pl-PL" dirty="0">
-                <a:hlinkClick r:id="rId2"/>
-              </a:rPr>
-              <a:t>https://www.martinfowler.com/bliki/TestDouble.html</a:t>
-            </a:r>
-            <a:endParaRPr lang="pl-PL" dirty="0"/>
-          </a:p>
-          <a:p>
-            <a:r>
-              <a:rPr lang="pl-PL" dirty="0">
-                <a:hlinkClick r:id="rId3"/>
-              </a:rPr>
-              <a:t>http://www.differencebetween.info/difference-between-stub-and-driver</a:t>
-            </a:r>
-            <a:endParaRPr lang="pl-PL" dirty="0"/>
-          </a:p>
-          <a:p>
-            <a:endParaRPr lang="pl-PL" dirty="0"/>
-          </a:p>
-          <a:p>
-            <a:pPr marL="0" indent="0">
-              <a:buNone/>
-            </a:pPr>
-            <a:endParaRPr lang="pl-PL" dirty="0"/>
-          </a:p>
-          <a:p>
-            <a:pPr marL="0" indent="0">
-              <a:buNone/>
-            </a:pPr>
-            <a:endParaRPr lang="pl-PL" dirty="0"/>
-          </a:p>
-        </p:txBody>
-      </p:sp>
-      <p:sp>
-        <p:nvSpPr>
-          <p:cNvPr id="4" name="Content Placeholder 3">
-            <a:extLst>
-              <a:ext uri="{FF2B5EF4-FFF2-40B4-BE49-F238E27FC236}">
-                <a16:creationId xmlns:a16="http://schemas.microsoft.com/office/drawing/2014/main" id="{C001A790-0B17-4DF7-B495-8F5B55CC5E53}"/>
-              </a:ext>
-            </a:extLst>
-          </p:cNvPr>
-          <p:cNvSpPr>
-            <a:spLocks noGrp="1"/>
-          </p:cNvSpPr>
-          <p:nvPr>
-            <p:ph sz="half" idx="2"/>
-          </p:nvPr>
-        </p:nvSpPr>
-        <p:spPr/>
-        <p:txBody>
-          <a:bodyPr>
-            <a:normAutofit/>
-          </a:bodyPr>
-          <a:lstStyle/>
-          <a:p>
-            <a:pPr marL="0" indent="0">
-              <a:buNone/>
-            </a:pPr>
-            <a:r>
-              <a:rPr lang="pl-PL" dirty="0" err="1"/>
-              <a:t>Documentations</a:t>
-            </a:r>
-            <a:r>
-              <a:rPr lang="pl-PL" dirty="0"/>
-              <a:t> &amp; </a:t>
-            </a:r>
-            <a:r>
-              <a:rPr lang="pl-PL" dirty="0" err="1"/>
-              <a:t>Standartds</a:t>
-            </a:r>
-            <a:endParaRPr lang="pl-PL" dirty="0"/>
-          </a:p>
-          <a:p>
-            <a:r>
-              <a:rPr lang="pl-PL" dirty="0">
-                <a:hlinkClick r:id="rId4"/>
-              </a:rPr>
-              <a:t>https://dom.spec.whatwg.org/</a:t>
-            </a:r>
-            <a:endParaRPr lang="pl-PL" dirty="0"/>
-          </a:p>
-          <a:p>
-            <a:r>
-              <a:rPr lang="pl-PL" dirty="0">
-                <a:hlinkClick r:id="rId5"/>
-              </a:rPr>
-              <a:t>https://www.w3.org/TR/DOM-Level-3-XPath/</a:t>
-            </a:r>
-            <a:endParaRPr lang="pl-PL" dirty="0"/>
-          </a:p>
-          <a:p>
-            <a:r>
-              <a:rPr lang="pl-PL" dirty="0">
-                <a:hlinkClick r:id="rId6"/>
-              </a:rPr>
-              <a:t>https://www.w3.org/TR/selectors-api/</a:t>
-            </a:r>
-            <a:endParaRPr lang="pl-PL" dirty="0"/>
-          </a:p>
-          <a:p>
-            <a:endParaRPr lang="pl-PL" dirty="0"/>
-          </a:p>
-          <a:p>
-            <a:endParaRPr lang="pl-PL" dirty="0"/>
-          </a:p>
-        </p:txBody>
-      </p:sp>
-      <p:sp>
-        <p:nvSpPr>
-          <p:cNvPr id="5" name="Footer Placeholder 4">
-            <a:extLst>
-              <a:ext uri="{FF2B5EF4-FFF2-40B4-BE49-F238E27FC236}">
-                <a16:creationId xmlns:a16="http://schemas.microsoft.com/office/drawing/2014/main" id="{1D605E15-2969-49F8-AC22-045AA75961D9}"/>
-              </a:ext>
-            </a:extLst>
-          </p:cNvPr>
-          <p:cNvSpPr>
-            <a:spLocks noGrp="1"/>
-          </p:cNvSpPr>
-          <p:nvPr>
-            <p:ph type="ftr" sz="quarter" idx="11"/>
-          </p:nvPr>
-        </p:nvSpPr>
-        <p:spPr/>
-        <p:txBody>
-          <a:bodyPr/>
-          <a:lstStyle/>
-          <a:p>
-            <a:r>
-              <a:rPr lang="pl-PL"/>
-              <a:t>@maciejwyrodek</a:t>
-            </a:r>
-          </a:p>
-        </p:txBody>
-      </p:sp>
-    </p:spTree>
-    <p:extLst>
-      <p:ext uri="{BB962C8B-B14F-4D97-AF65-F5344CB8AC3E}">
-        <p14:creationId xmlns:p14="http://schemas.microsoft.com/office/powerpoint/2010/main" val="2734435824"/>
-      </p:ext>
-    </p:extLst>
-  </p:cSld>
-  <p:clrMapOvr>
-    <a:masterClrMapping/>
-  </p:clrMapOvr>
-</p:sld>
-</file>
-
-<file path=ppt/slides/slide45.xml><?xml version="1.0" encoding="utf-8"?>
-<p:sld xmlns:a="http://schemas.openxmlformats.org/drawingml/2006/main" xmlns:r="http://schemas.openxmlformats.org/officeDocument/2006/relationships" xmlns:p="http://schemas.openxmlformats.org/presentationml/2006/main">
-  <p:cSld>
-    <p:spTree>
-      <p:nvGrpSpPr>
-        <p:cNvPr id="1" name=""/>
-        <p:cNvGrpSpPr/>
-        <p:nvPr/>
-      </p:nvGrpSpPr>
-      <p:grpSpPr>
-        <a:xfrm>
-          <a:off x="0" y="0"/>
-          <a:ext cx="0" cy="0"/>
-          <a:chOff x="0" y="0"/>
-          <a:chExt cx="0" cy="0"/>
-        </a:xfrm>
-      </p:grpSpPr>
-      <p:sp>
-        <p:nvSpPr>
-          <p:cNvPr id="2" name="Title 1">
-            <a:extLst>
-              <a:ext uri="{FF2B5EF4-FFF2-40B4-BE49-F238E27FC236}">
-                <a16:creationId xmlns:a16="http://schemas.microsoft.com/office/drawing/2014/main" id="{680B92B4-F66D-458B-B3C1-CD182E40FF9D}"/>
-              </a:ext>
-            </a:extLst>
-          </p:cNvPr>
-          <p:cNvSpPr>
-            <a:spLocks noGrp="1"/>
-          </p:cNvSpPr>
-          <p:nvPr>
-            <p:ph type="title"/>
-          </p:nvPr>
-        </p:nvSpPr>
-        <p:spPr/>
-        <p:txBody>
-          <a:bodyPr/>
-          <a:lstStyle/>
-          <a:p>
-            <a:r>
-              <a:rPr lang="pl-PL" dirty="0" err="1"/>
-              <a:t>Sources</a:t>
-            </a:r>
-            <a:r>
-              <a:rPr lang="pl-PL" dirty="0"/>
-              <a:t> </a:t>
-            </a:r>
-            <a:r>
-              <a:rPr lang="pl-PL" dirty="0" err="1"/>
-              <a:t>pt</a:t>
-            </a:r>
-            <a:r>
-              <a:rPr lang="pl-PL" dirty="0"/>
-              <a:t> 2</a:t>
-            </a:r>
-          </a:p>
-        </p:txBody>
-      </p:sp>
-      <p:sp>
-        <p:nvSpPr>
-          <p:cNvPr id="3" name="Content Placeholder 2">
-            <a:extLst>
-              <a:ext uri="{FF2B5EF4-FFF2-40B4-BE49-F238E27FC236}">
-                <a16:creationId xmlns:a16="http://schemas.microsoft.com/office/drawing/2014/main" id="{FF2E289B-87C9-4151-966F-BD90991CE5C2}"/>
-              </a:ext>
-            </a:extLst>
-          </p:cNvPr>
-          <p:cNvSpPr>
-            <a:spLocks noGrp="1"/>
-          </p:cNvSpPr>
-          <p:nvPr>
-            <p:ph sz="half" idx="1"/>
-          </p:nvPr>
-        </p:nvSpPr>
-        <p:spPr/>
-        <p:txBody>
-          <a:bodyPr>
-            <a:normAutofit lnSpcReduction="10000"/>
-          </a:bodyPr>
-          <a:lstStyle/>
-          <a:p>
-            <a:pPr marL="0" indent="0">
-              <a:buNone/>
-            </a:pPr>
-            <a:r>
-              <a:rPr lang="pl-PL" dirty="0" err="1"/>
-              <a:t>Codes</a:t>
-            </a:r>
-            <a:r>
-              <a:rPr lang="pl-PL" dirty="0"/>
-              <a:t> </a:t>
-            </a:r>
-            <a:r>
-              <a:rPr lang="pl-PL" dirty="0" err="1"/>
-              <a:t>Repostiories</a:t>
-            </a:r>
-            <a:endParaRPr lang="pl-PL" dirty="0"/>
-          </a:p>
-          <a:p>
-            <a:r>
-              <a:rPr lang="pl-PL" dirty="0">
-                <a:hlinkClick r:id="rId2"/>
-              </a:rPr>
-              <a:t>https://github.com/SeleniumHQ/selenium</a:t>
-            </a:r>
-            <a:endParaRPr lang="pl-PL" dirty="0"/>
-          </a:p>
-          <a:p>
-            <a:r>
-              <a:rPr lang="pl-PL" dirty="0">
-                <a:hlinkClick r:id="rId3"/>
-              </a:rPr>
-              <a:t>https://chromium.googlesource.com/chromium/src/+/master/chrome/test/chromedriver/</a:t>
-            </a:r>
-            <a:endParaRPr lang="pl-PL" dirty="0"/>
-          </a:p>
-          <a:p>
-            <a:r>
-              <a:rPr lang="pl-PL" dirty="0">
-                <a:hlinkClick r:id="rId4"/>
-              </a:rPr>
-              <a:t>https://github.com/bayandin/chromedriver</a:t>
-            </a:r>
-            <a:endParaRPr lang="pl-PL" dirty="0"/>
-          </a:p>
-          <a:p>
-            <a:r>
-              <a:rPr lang="pl-PL" dirty="0">
-                <a:hlinkClick r:id="rId5"/>
-              </a:rPr>
-              <a:t>https://github.com/ChromeDevTools/awesome-chrome-devtools</a:t>
-            </a:r>
-            <a:endParaRPr lang="pl-PL" dirty="0"/>
-          </a:p>
-          <a:p>
-            <a:endParaRPr lang="pl-PL" dirty="0"/>
-          </a:p>
-          <a:p>
-            <a:endParaRPr lang="pl-PL" dirty="0"/>
-          </a:p>
-        </p:txBody>
-      </p:sp>
-      <p:sp>
-        <p:nvSpPr>
-          <p:cNvPr id="4" name="Content Placeholder 3">
-            <a:extLst>
-              <a:ext uri="{FF2B5EF4-FFF2-40B4-BE49-F238E27FC236}">
-                <a16:creationId xmlns:a16="http://schemas.microsoft.com/office/drawing/2014/main" id="{C001A790-0B17-4DF7-B495-8F5B55CC5E53}"/>
-              </a:ext>
-            </a:extLst>
-          </p:cNvPr>
-          <p:cNvSpPr>
-            <a:spLocks noGrp="1"/>
-          </p:cNvSpPr>
-          <p:nvPr>
-            <p:ph sz="half" idx="2"/>
-          </p:nvPr>
-        </p:nvSpPr>
-        <p:spPr/>
-        <p:txBody>
-          <a:bodyPr>
-            <a:normAutofit lnSpcReduction="10000"/>
-          </a:bodyPr>
-          <a:lstStyle/>
-          <a:p>
-            <a:pPr marL="0" indent="0">
-              <a:buNone/>
-            </a:pPr>
-            <a:r>
-              <a:rPr lang="pl-PL" dirty="0" err="1"/>
-              <a:t>Other</a:t>
-            </a:r>
-            <a:endParaRPr lang="pl-PL" dirty="0"/>
-          </a:p>
-          <a:p>
-            <a:r>
-              <a:rPr lang="pl-PL" dirty="0">
-                <a:hlinkClick r:id="rId6"/>
-              </a:rPr>
-              <a:t>http://scraping.pro/what-is-selenium-webdriver/</a:t>
-            </a:r>
-            <a:endParaRPr lang="pl-PL" dirty="0"/>
-          </a:p>
-          <a:p>
-            <a:r>
-              <a:rPr lang="pl-PL" dirty="0">
-                <a:hlinkClick r:id="rId7"/>
-              </a:rPr>
-              <a:t>https://github.com/SeleniumHQ/selenium/wiki/Automation-Atoms</a:t>
-            </a:r>
-            <a:endParaRPr lang="pl-PL" dirty="0"/>
-          </a:p>
-          <a:p>
-            <a:r>
-              <a:rPr lang="pl-PL" dirty="0">
-                <a:hlinkClick r:id="rId8"/>
-              </a:rPr>
-              <a:t>https://caniuse.com</a:t>
-            </a:r>
-            <a:endParaRPr lang="pl-PL" dirty="0"/>
-          </a:p>
-          <a:p>
-            <a:r>
-              <a:rPr lang="pl-PL" dirty="0">
-                <a:hlinkClick r:id="rId9"/>
-              </a:rPr>
-              <a:t>https://firefox-source-docs.mozilla.org/testing/marionette/Intro.html</a:t>
-            </a:r>
-            <a:endParaRPr lang="pl-PL" dirty="0"/>
-          </a:p>
-          <a:p>
-            <a:r>
-              <a:rPr lang="pl-PL" dirty="0">
-                <a:hlinkClick r:id="rId10"/>
-              </a:rPr>
-              <a:t>https://chromedevtools.github.io/devtools-protocol/</a:t>
-            </a:r>
-            <a:endParaRPr lang="pl-PL" dirty="0"/>
-          </a:p>
-          <a:p>
-            <a:endParaRPr lang="pl-PL" dirty="0"/>
-          </a:p>
-          <a:p>
-            <a:endParaRPr lang="pl-PL" dirty="0"/>
-          </a:p>
-        </p:txBody>
-      </p:sp>
-      <p:sp>
-        <p:nvSpPr>
-          <p:cNvPr id="5" name="Footer Placeholder 4">
-            <a:extLst>
-              <a:ext uri="{FF2B5EF4-FFF2-40B4-BE49-F238E27FC236}">
-                <a16:creationId xmlns:a16="http://schemas.microsoft.com/office/drawing/2014/main" id="{1D605E15-2969-49F8-AC22-045AA75961D9}"/>
-              </a:ext>
-            </a:extLst>
-          </p:cNvPr>
-          <p:cNvSpPr>
-            <a:spLocks noGrp="1"/>
-          </p:cNvSpPr>
-          <p:nvPr>
-            <p:ph type="ftr" sz="quarter" idx="11"/>
-          </p:nvPr>
-        </p:nvSpPr>
-        <p:spPr/>
-        <p:txBody>
-          <a:bodyPr/>
-          <a:lstStyle/>
-          <a:p>
-            <a:r>
-              <a:rPr lang="pl-PL"/>
-              <a:t>@maciejwyrodek</a:t>
-            </a:r>
-          </a:p>
-        </p:txBody>
-      </p:sp>
-    </p:spTree>
-    <p:extLst>
-      <p:ext uri="{BB962C8B-B14F-4D97-AF65-F5344CB8AC3E}">
-        <p14:creationId xmlns:p14="http://schemas.microsoft.com/office/powerpoint/2010/main" val="2363687600"/>
-      </p:ext>
-    </p:extLst>
-  </p:cSld>
-  <p:clrMapOvr>
-    <a:masterClrMapping/>
-  </p:clrMapOvr>
-</p:sld>
-</file>
-
 <file path=ppt/slides/slide46.xml><?xml version="1.0" encoding="utf-8"?>
 <p:sld xmlns:a="http://schemas.openxmlformats.org/drawingml/2006/main" xmlns:r="http://schemas.openxmlformats.org/officeDocument/2006/relationships" xmlns:p="http://schemas.openxmlformats.org/presentationml/2006/main">
   <p:cSld>
@@ -17469,6 +16675,515 @@
               <a:rPr lang="pl-PL" dirty="0" err="1"/>
               <a:t>Sources</a:t>
             </a:r>
+            <a:endParaRPr lang="pl-PL" dirty="0"/>
+          </a:p>
+        </p:txBody>
+      </p:sp>
+      <p:sp>
+        <p:nvSpPr>
+          <p:cNvPr id="3" name="Content Placeholder 2">
+            <a:extLst>
+              <a:ext uri="{FF2B5EF4-FFF2-40B4-BE49-F238E27FC236}">
+                <a16:creationId xmlns:a16="http://schemas.microsoft.com/office/drawing/2014/main" id="{FF2E289B-87C9-4151-966F-BD90991CE5C2}"/>
+              </a:ext>
+            </a:extLst>
+          </p:cNvPr>
+          <p:cNvSpPr>
+            <a:spLocks noGrp="1"/>
+          </p:cNvSpPr>
+          <p:nvPr>
+            <p:ph sz="half" idx="1"/>
+          </p:nvPr>
+        </p:nvSpPr>
+        <p:spPr/>
+        <p:txBody>
+          <a:bodyPr>
+            <a:normAutofit/>
+          </a:bodyPr>
+          <a:lstStyle/>
+          <a:p>
+            <a:pPr marL="0" indent="0">
+              <a:buNone/>
+            </a:pPr>
+            <a:r>
+              <a:rPr lang="pl-PL" dirty="0"/>
+              <a:t>Test </a:t>
+            </a:r>
+            <a:r>
+              <a:rPr lang="pl-PL" dirty="0" err="1"/>
+              <a:t>Doubles</a:t>
+            </a:r>
+            <a:r>
+              <a:rPr lang="pl-PL" dirty="0"/>
+              <a:t>:</a:t>
+            </a:r>
+          </a:p>
+          <a:p>
+            <a:r>
+              <a:rPr lang="pl-PL" dirty="0">
+                <a:hlinkClick r:id="rId2"/>
+              </a:rPr>
+              <a:t>https://www.martinfowler.com/bliki/TestDouble.html</a:t>
+            </a:r>
+            <a:endParaRPr lang="pl-PL" dirty="0"/>
+          </a:p>
+          <a:p>
+            <a:r>
+              <a:rPr lang="pl-PL" dirty="0">
+                <a:hlinkClick r:id="rId3"/>
+              </a:rPr>
+              <a:t>http://www.differencebetween.info/difference-between-stub-and-driver</a:t>
+            </a:r>
+            <a:endParaRPr lang="pl-PL" dirty="0"/>
+          </a:p>
+          <a:p>
+            <a:endParaRPr lang="pl-PL" dirty="0"/>
+          </a:p>
+          <a:p>
+            <a:pPr marL="0" indent="0">
+              <a:buNone/>
+            </a:pPr>
+            <a:endParaRPr lang="pl-PL" dirty="0"/>
+          </a:p>
+          <a:p>
+            <a:pPr marL="0" indent="0">
+              <a:buNone/>
+            </a:pPr>
+            <a:endParaRPr lang="pl-PL" dirty="0"/>
+          </a:p>
+        </p:txBody>
+      </p:sp>
+      <p:sp>
+        <p:nvSpPr>
+          <p:cNvPr id="4" name="Content Placeholder 3">
+            <a:extLst>
+              <a:ext uri="{FF2B5EF4-FFF2-40B4-BE49-F238E27FC236}">
+                <a16:creationId xmlns:a16="http://schemas.microsoft.com/office/drawing/2014/main" id="{C001A790-0B17-4DF7-B495-8F5B55CC5E53}"/>
+              </a:ext>
+            </a:extLst>
+          </p:cNvPr>
+          <p:cNvSpPr>
+            <a:spLocks noGrp="1"/>
+          </p:cNvSpPr>
+          <p:nvPr>
+            <p:ph sz="half" idx="2"/>
+          </p:nvPr>
+        </p:nvSpPr>
+        <p:spPr/>
+        <p:txBody>
+          <a:bodyPr>
+            <a:normAutofit/>
+          </a:bodyPr>
+          <a:lstStyle/>
+          <a:p>
+            <a:pPr marL="0" indent="0">
+              <a:buNone/>
+            </a:pPr>
+            <a:r>
+              <a:rPr lang="pl-PL" dirty="0" err="1"/>
+              <a:t>Documentations</a:t>
+            </a:r>
+            <a:r>
+              <a:rPr lang="pl-PL" dirty="0"/>
+              <a:t> &amp; </a:t>
+            </a:r>
+            <a:r>
+              <a:rPr lang="pl-PL" dirty="0" err="1"/>
+              <a:t>Standards</a:t>
+            </a:r>
+            <a:endParaRPr lang="pl-PL" dirty="0"/>
+          </a:p>
+          <a:p>
+            <a:r>
+              <a:rPr lang="pl-PL" dirty="0">
+                <a:hlinkClick r:id="rId4"/>
+              </a:rPr>
+              <a:t>https://dom.spec.whatwg.org/</a:t>
+            </a:r>
+            <a:endParaRPr lang="pl-PL" dirty="0"/>
+          </a:p>
+          <a:p>
+            <a:r>
+              <a:rPr lang="pl-PL" dirty="0">
+                <a:hlinkClick r:id="rId5"/>
+              </a:rPr>
+              <a:t>https://www.w3.org/TR/DOM-Level-3-XPath/</a:t>
+            </a:r>
+            <a:endParaRPr lang="pl-PL" dirty="0"/>
+          </a:p>
+          <a:p>
+            <a:r>
+              <a:rPr lang="pl-PL" dirty="0">
+                <a:hlinkClick r:id="rId6"/>
+              </a:rPr>
+              <a:t>https://www.w3.org/TR/selectors-api/</a:t>
+            </a:r>
+            <a:endParaRPr lang="pl-PL" dirty="0"/>
+          </a:p>
+          <a:p>
+            <a:r>
+              <a:rPr lang="pl-PL" dirty="0">
+                <a:hlinkClick r:id="rId7"/>
+              </a:rPr>
+              <a:t>https://www.w3.org/TR/webdriver1/</a:t>
+            </a:r>
+            <a:endParaRPr lang="pl-PL" dirty="0"/>
+          </a:p>
+          <a:p>
+            <a:endParaRPr lang="pl-PL" dirty="0"/>
+          </a:p>
+        </p:txBody>
+      </p:sp>
+      <p:sp>
+        <p:nvSpPr>
+          <p:cNvPr id="5" name="Footer Placeholder 4">
+            <a:extLst>
+              <a:ext uri="{FF2B5EF4-FFF2-40B4-BE49-F238E27FC236}">
+                <a16:creationId xmlns:a16="http://schemas.microsoft.com/office/drawing/2014/main" id="{1D605E15-2969-49F8-AC22-045AA75961D9}"/>
+              </a:ext>
+            </a:extLst>
+          </p:cNvPr>
+          <p:cNvSpPr>
+            <a:spLocks noGrp="1"/>
+          </p:cNvSpPr>
+          <p:nvPr>
+            <p:ph type="ftr" sz="quarter" idx="11"/>
+          </p:nvPr>
+        </p:nvSpPr>
+        <p:spPr/>
+        <p:txBody>
+          <a:bodyPr/>
+          <a:lstStyle/>
+          <a:p>
+            <a:r>
+              <a:rPr lang="pl-PL"/>
+              <a:t>@maciejwyrodek</a:t>
+            </a:r>
+          </a:p>
+        </p:txBody>
+      </p:sp>
+    </p:spTree>
+    <p:extLst>
+      <p:ext uri="{BB962C8B-B14F-4D97-AF65-F5344CB8AC3E}">
+        <p14:creationId xmlns:p14="http://schemas.microsoft.com/office/powerpoint/2010/main" val="2734435824"/>
+      </p:ext>
+    </p:extLst>
+  </p:cSld>
+  <p:clrMapOvr>
+    <a:masterClrMapping/>
+  </p:clrMapOvr>
+</p:sld>
+</file>
+
+<file path=ppt/slides/slide47.xml><?xml version="1.0" encoding="utf-8"?>
+<p:sld xmlns:a="http://schemas.openxmlformats.org/drawingml/2006/main" xmlns:r="http://schemas.openxmlformats.org/officeDocument/2006/relationships" xmlns:p="http://schemas.openxmlformats.org/presentationml/2006/main">
+  <p:cSld>
+    <p:spTree>
+      <p:nvGrpSpPr>
+        <p:cNvPr id="1" name=""/>
+        <p:cNvGrpSpPr/>
+        <p:nvPr/>
+      </p:nvGrpSpPr>
+      <p:grpSpPr>
+        <a:xfrm>
+          <a:off x="0" y="0"/>
+          <a:ext cx="0" cy="0"/>
+          <a:chOff x="0" y="0"/>
+          <a:chExt cx="0" cy="0"/>
+        </a:xfrm>
+      </p:grpSpPr>
+      <p:sp>
+        <p:nvSpPr>
+          <p:cNvPr id="2" name="Title 1">
+            <a:extLst>
+              <a:ext uri="{FF2B5EF4-FFF2-40B4-BE49-F238E27FC236}">
+                <a16:creationId xmlns:a16="http://schemas.microsoft.com/office/drawing/2014/main" id="{680B92B4-F66D-458B-B3C1-CD182E40FF9D}"/>
+              </a:ext>
+            </a:extLst>
+          </p:cNvPr>
+          <p:cNvSpPr>
+            <a:spLocks noGrp="1"/>
+          </p:cNvSpPr>
+          <p:nvPr>
+            <p:ph type="title"/>
+          </p:nvPr>
+        </p:nvSpPr>
+        <p:spPr/>
+        <p:txBody>
+          <a:bodyPr/>
+          <a:lstStyle/>
+          <a:p>
+            <a:r>
+              <a:rPr lang="pl-PL" dirty="0" err="1"/>
+              <a:t>Sources</a:t>
+            </a:r>
+            <a:r>
+              <a:rPr lang="pl-PL" dirty="0"/>
+              <a:t> </a:t>
+            </a:r>
+            <a:r>
+              <a:rPr lang="pl-PL" dirty="0" err="1"/>
+              <a:t>pt</a:t>
+            </a:r>
+            <a:r>
+              <a:rPr lang="pl-PL" dirty="0"/>
+              <a:t> 2</a:t>
+            </a:r>
+          </a:p>
+        </p:txBody>
+      </p:sp>
+      <p:sp>
+        <p:nvSpPr>
+          <p:cNvPr id="3" name="Content Placeholder 2">
+            <a:extLst>
+              <a:ext uri="{FF2B5EF4-FFF2-40B4-BE49-F238E27FC236}">
+                <a16:creationId xmlns:a16="http://schemas.microsoft.com/office/drawing/2014/main" id="{FF2E289B-87C9-4151-966F-BD90991CE5C2}"/>
+              </a:ext>
+            </a:extLst>
+          </p:cNvPr>
+          <p:cNvSpPr>
+            <a:spLocks noGrp="1"/>
+          </p:cNvSpPr>
+          <p:nvPr>
+            <p:ph sz="half" idx="1"/>
+          </p:nvPr>
+        </p:nvSpPr>
+        <p:spPr/>
+        <p:txBody>
+          <a:bodyPr>
+            <a:normAutofit lnSpcReduction="10000"/>
+          </a:bodyPr>
+          <a:lstStyle/>
+          <a:p>
+            <a:pPr marL="0" indent="0">
+              <a:buNone/>
+            </a:pPr>
+            <a:r>
+              <a:rPr lang="pl-PL" dirty="0" err="1"/>
+              <a:t>Code</a:t>
+            </a:r>
+            <a:r>
+              <a:rPr lang="pl-PL" dirty="0"/>
+              <a:t> </a:t>
+            </a:r>
+            <a:r>
+              <a:rPr lang="pl-PL" dirty="0" err="1"/>
+              <a:t>Repositories</a:t>
+            </a:r>
+            <a:endParaRPr lang="pl-PL" dirty="0"/>
+          </a:p>
+          <a:p>
+            <a:r>
+              <a:rPr lang="pl-PL" dirty="0">
+                <a:hlinkClick r:id="rId2"/>
+              </a:rPr>
+              <a:t>https://github.com/SeleniumHQ/selenium</a:t>
+            </a:r>
+            <a:endParaRPr lang="pl-PL" dirty="0"/>
+          </a:p>
+          <a:p>
+            <a:r>
+              <a:rPr lang="pl-PL" dirty="0">
+                <a:hlinkClick r:id="rId3"/>
+              </a:rPr>
+              <a:t>https://chromium.googlesource.com/chromium/src/+/master/chrome/test/chromedriver/</a:t>
+            </a:r>
+            <a:endParaRPr lang="pl-PL" dirty="0"/>
+          </a:p>
+          <a:p>
+            <a:r>
+              <a:rPr lang="pl-PL" dirty="0">
+                <a:hlinkClick r:id="rId4"/>
+              </a:rPr>
+              <a:t>https://github.com/bayandin/chromedriver</a:t>
+            </a:r>
+            <a:endParaRPr lang="pl-PL" dirty="0"/>
+          </a:p>
+          <a:p>
+            <a:r>
+              <a:rPr lang="pl-PL" dirty="0">
+                <a:hlinkClick r:id="rId5"/>
+              </a:rPr>
+              <a:t>https://github.com/ChromeDevTools/awesome-chrome-devtools</a:t>
+            </a:r>
+            <a:endParaRPr lang="pl-PL" dirty="0"/>
+          </a:p>
+          <a:p>
+            <a:endParaRPr lang="pl-PL" dirty="0"/>
+          </a:p>
+          <a:p>
+            <a:endParaRPr lang="pl-PL" dirty="0"/>
+          </a:p>
+        </p:txBody>
+      </p:sp>
+      <p:sp>
+        <p:nvSpPr>
+          <p:cNvPr id="4" name="Content Placeholder 3">
+            <a:extLst>
+              <a:ext uri="{FF2B5EF4-FFF2-40B4-BE49-F238E27FC236}">
+                <a16:creationId xmlns:a16="http://schemas.microsoft.com/office/drawing/2014/main" id="{C001A790-0B17-4DF7-B495-8F5B55CC5E53}"/>
+              </a:ext>
+            </a:extLst>
+          </p:cNvPr>
+          <p:cNvSpPr>
+            <a:spLocks noGrp="1"/>
+          </p:cNvSpPr>
+          <p:nvPr>
+            <p:ph sz="half" idx="2"/>
+          </p:nvPr>
+        </p:nvSpPr>
+        <p:spPr/>
+        <p:txBody>
+          <a:bodyPr>
+            <a:normAutofit lnSpcReduction="10000"/>
+          </a:bodyPr>
+          <a:lstStyle/>
+          <a:p>
+            <a:pPr marL="0" indent="0">
+              <a:buNone/>
+            </a:pPr>
+            <a:r>
+              <a:rPr lang="pl-PL" dirty="0" err="1"/>
+              <a:t>Other</a:t>
+            </a:r>
+            <a:endParaRPr lang="pl-PL" dirty="0"/>
+          </a:p>
+          <a:p>
+            <a:r>
+              <a:rPr lang="pl-PL" dirty="0">
+                <a:hlinkClick r:id="rId6"/>
+              </a:rPr>
+              <a:t>http://scraping.pro/what-is-selenium-webdriver/</a:t>
+            </a:r>
+            <a:endParaRPr lang="pl-PL" dirty="0"/>
+          </a:p>
+          <a:p>
+            <a:r>
+              <a:rPr lang="pl-PL" dirty="0">
+                <a:hlinkClick r:id="rId7"/>
+              </a:rPr>
+              <a:t>https://github.com/SeleniumHQ/selenium/wiki/Automation-Atoms</a:t>
+            </a:r>
+            <a:endParaRPr lang="pl-PL" dirty="0"/>
+          </a:p>
+          <a:p>
+            <a:r>
+              <a:rPr lang="pl-PL" dirty="0">
+                <a:hlinkClick r:id="rId8"/>
+              </a:rPr>
+              <a:t>https://caniuse.com</a:t>
+            </a:r>
+            <a:endParaRPr lang="pl-PL" dirty="0"/>
+          </a:p>
+          <a:p>
+            <a:r>
+              <a:rPr lang="pl-PL" dirty="0">
+                <a:hlinkClick r:id="rId9"/>
+              </a:rPr>
+              <a:t>https://firefox-source-docs.mozilla.org/testing/marionette/Intro.html</a:t>
+            </a:r>
+            <a:endParaRPr lang="pl-PL" dirty="0"/>
+          </a:p>
+          <a:p>
+            <a:r>
+              <a:rPr lang="pl-PL" dirty="0">
+                <a:hlinkClick r:id="rId10"/>
+              </a:rPr>
+              <a:t>https://chromedevtools.github.io/devtools-protocol/</a:t>
+            </a:r>
+            <a:endParaRPr lang="pl-PL" dirty="0"/>
+          </a:p>
+          <a:p>
+            <a:endParaRPr lang="pl-PL" dirty="0"/>
+          </a:p>
+          <a:p>
+            <a:endParaRPr lang="pl-PL" dirty="0"/>
+          </a:p>
+        </p:txBody>
+      </p:sp>
+      <p:sp>
+        <p:nvSpPr>
+          <p:cNvPr id="5" name="Footer Placeholder 4">
+            <a:extLst>
+              <a:ext uri="{FF2B5EF4-FFF2-40B4-BE49-F238E27FC236}">
+                <a16:creationId xmlns:a16="http://schemas.microsoft.com/office/drawing/2014/main" id="{1D605E15-2969-49F8-AC22-045AA75961D9}"/>
+              </a:ext>
+            </a:extLst>
+          </p:cNvPr>
+          <p:cNvSpPr>
+            <a:spLocks noGrp="1"/>
+          </p:cNvSpPr>
+          <p:nvPr>
+            <p:ph type="ftr" sz="quarter" idx="11"/>
+          </p:nvPr>
+        </p:nvSpPr>
+        <p:spPr/>
+        <p:txBody>
+          <a:bodyPr/>
+          <a:lstStyle/>
+          <a:p>
+            <a:r>
+              <a:rPr lang="pl-PL"/>
+              <a:t>@maciejwyrodek</a:t>
+            </a:r>
+          </a:p>
+        </p:txBody>
+      </p:sp>
+    </p:spTree>
+    <p:extLst>
+      <p:ext uri="{BB962C8B-B14F-4D97-AF65-F5344CB8AC3E}">
+        <p14:creationId xmlns:p14="http://schemas.microsoft.com/office/powerpoint/2010/main" val="2363687600"/>
+      </p:ext>
+    </p:extLst>
+  </p:cSld>
+  <p:clrMapOvr>
+    <a:masterClrMapping/>
+  </p:clrMapOvr>
+</p:sld>
+</file>
+
+<file path=ppt/slides/slide48.xml><?xml version="1.0" encoding="utf-8"?>
+<p:sld xmlns:a="http://schemas.openxmlformats.org/drawingml/2006/main" xmlns:r="http://schemas.openxmlformats.org/officeDocument/2006/relationships" xmlns:p="http://schemas.openxmlformats.org/presentationml/2006/main">
+  <p:cSld>
+    <p:spTree>
+      <p:nvGrpSpPr>
+        <p:cNvPr id="1" name=""/>
+        <p:cNvGrpSpPr/>
+        <p:nvPr/>
+      </p:nvGrpSpPr>
+      <p:grpSpPr>
+        <a:xfrm>
+          <a:off x="0" y="0"/>
+          <a:ext cx="0" cy="0"/>
+          <a:chOff x="0" y="0"/>
+          <a:chExt cx="0" cy="0"/>
+        </a:xfrm>
+      </p:grpSpPr>
+      <p:sp>
+        <p:nvSpPr>
+          <p:cNvPr id="2" name="Title 1">
+            <a:extLst>
+              <a:ext uri="{FF2B5EF4-FFF2-40B4-BE49-F238E27FC236}">
+                <a16:creationId xmlns:a16="http://schemas.microsoft.com/office/drawing/2014/main" id="{680B92B4-F66D-458B-B3C1-CD182E40FF9D}"/>
+              </a:ext>
+            </a:extLst>
+          </p:cNvPr>
+          <p:cNvSpPr>
+            <a:spLocks noGrp="1"/>
+          </p:cNvSpPr>
+          <p:nvPr>
+            <p:ph type="title"/>
+          </p:nvPr>
+        </p:nvSpPr>
+        <p:spPr/>
+        <p:txBody>
+          <a:bodyPr/>
+          <a:lstStyle/>
+          <a:p>
+            <a:r>
+              <a:rPr lang="pl-PL" dirty="0" err="1"/>
+              <a:t>Sources</a:t>
+            </a:r>
             <a:r>
               <a:rPr lang="pl-PL" dirty="0"/>
               <a:t> </a:t>
@@ -17678,6 +17393,255 @@
     <p:extLst>
       <p:ext uri="{BB962C8B-B14F-4D97-AF65-F5344CB8AC3E}">
         <p14:creationId xmlns:p14="http://schemas.microsoft.com/office/powerpoint/2010/main" val="2205740119"/>
+      </p:ext>
+    </p:extLst>
+  </p:cSld>
+  <p:clrMapOvr>
+    <a:masterClrMapping/>
+  </p:clrMapOvr>
+</p:sld>
+</file>
+
+<file path=ppt/slides/slide49.xml><?xml version="1.0" encoding="utf-8"?>
+<p:sld xmlns:a="http://schemas.openxmlformats.org/drawingml/2006/main" xmlns:r="http://schemas.openxmlformats.org/officeDocument/2006/relationships" xmlns:p="http://schemas.openxmlformats.org/presentationml/2006/main">
+  <p:cSld>
+    <p:spTree>
+      <p:nvGrpSpPr>
+        <p:cNvPr id="1" name=""/>
+        <p:cNvGrpSpPr/>
+        <p:nvPr/>
+      </p:nvGrpSpPr>
+      <p:grpSpPr>
+        <a:xfrm>
+          <a:off x="0" y="0"/>
+          <a:ext cx="0" cy="0"/>
+          <a:chOff x="0" y="0"/>
+          <a:chExt cx="0" cy="0"/>
+        </a:xfrm>
+      </p:grpSpPr>
+      <p:sp>
+        <p:nvSpPr>
+          <p:cNvPr id="2" name="Title 1">
+            <a:extLst>
+              <a:ext uri="{FF2B5EF4-FFF2-40B4-BE49-F238E27FC236}">
+                <a16:creationId xmlns:a16="http://schemas.microsoft.com/office/drawing/2014/main" id="{680B92B4-F66D-458B-B3C1-CD182E40FF9D}"/>
+              </a:ext>
+            </a:extLst>
+          </p:cNvPr>
+          <p:cNvSpPr>
+            <a:spLocks noGrp="1"/>
+          </p:cNvSpPr>
+          <p:nvPr>
+            <p:ph type="title"/>
+          </p:nvPr>
+        </p:nvSpPr>
+        <p:spPr/>
+        <p:txBody>
+          <a:bodyPr/>
+          <a:lstStyle/>
+          <a:p>
+            <a:r>
+              <a:rPr lang="pl-PL" dirty="0" err="1"/>
+              <a:t>Sources</a:t>
+            </a:r>
+            <a:r>
+              <a:rPr lang="pl-PL" dirty="0"/>
+              <a:t> </a:t>
+            </a:r>
+            <a:r>
+              <a:rPr lang="pl-PL" dirty="0" err="1"/>
+              <a:t>pt</a:t>
+            </a:r>
+            <a:r>
+              <a:rPr lang="pl-PL" dirty="0"/>
+              <a:t> 4</a:t>
+            </a:r>
+          </a:p>
+        </p:txBody>
+      </p:sp>
+      <p:sp>
+        <p:nvSpPr>
+          <p:cNvPr id="3" name="Content Placeholder 2">
+            <a:extLst>
+              <a:ext uri="{FF2B5EF4-FFF2-40B4-BE49-F238E27FC236}">
+                <a16:creationId xmlns:a16="http://schemas.microsoft.com/office/drawing/2014/main" id="{FF2E289B-87C9-4151-966F-BD90991CE5C2}"/>
+              </a:ext>
+            </a:extLst>
+          </p:cNvPr>
+          <p:cNvSpPr>
+            <a:spLocks noGrp="1"/>
+          </p:cNvSpPr>
+          <p:nvPr>
+            <p:ph sz="half" idx="1"/>
+          </p:nvPr>
+        </p:nvSpPr>
+        <p:spPr/>
+        <p:txBody>
+          <a:bodyPr>
+            <a:normAutofit lnSpcReduction="10000"/>
+          </a:bodyPr>
+          <a:lstStyle/>
+          <a:p>
+            <a:pPr marL="0" indent="0">
+              <a:buNone/>
+            </a:pPr>
+            <a:r>
+              <a:rPr lang="pl-PL" dirty="0" err="1"/>
+              <a:t>Other</a:t>
+            </a:r>
+            <a:r>
+              <a:rPr lang="pl-PL" dirty="0"/>
+              <a:t>:</a:t>
+            </a:r>
+          </a:p>
+          <a:p>
+            <a:r>
+              <a:rPr lang="pl-PL" dirty="0">
+                <a:hlinkClick r:id="rId2"/>
+              </a:rPr>
+              <a:t>https://cs.chromium.org/chromium/src/chrome/test/chromedriver/README.txt</a:t>
+            </a:r>
+            <a:endParaRPr lang="pl-PL" dirty="0"/>
+          </a:p>
+          <a:p>
+            <a:r>
+              <a:rPr lang="pl-PL" dirty="0">
+                <a:hlinkClick r:id="rId3"/>
+              </a:rPr>
+              <a:t>https://www.html5rocks.com/en/tutorials/internals/howbrowserswork/</a:t>
+            </a:r>
+            <a:endParaRPr lang="pl-PL" dirty="0"/>
+          </a:p>
+          <a:p>
+            <a:r>
+              <a:rPr lang="pl-PL" dirty="0">
+                <a:hlinkClick r:id="rId4"/>
+              </a:rPr>
+              <a:t>https://wiki.mozilla.org/Gecko:Overview</a:t>
+            </a:r>
+            <a:endParaRPr lang="pl-PL" dirty="0"/>
+          </a:p>
+          <a:p>
+            <a:r>
+              <a:rPr lang="pl-PL" dirty="0">
+                <a:hlinkClick r:id="rId5"/>
+              </a:rPr>
+              <a:t>https://html.spec.whatwg.org/multipage/parsing.html</a:t>
+            </a:r>
+            <a:br>
+              <a:rPr lang="pl-PL" dirty="0"/>
+            </a:br>
+            <a:br>
+              <a:rPr lang="pl-PL" dirty="0"/>
+            </a:br>
+            <a:endParaRPr lang="pl-PL" dirty="0"/>
+          </a:p>
+        </p:txBody>
+      </p:sp>
+      <p:sp>
+        <p:nvSpPr>
+          <p:cNvPr id="5" name="Footer Placeholder 4">
+            <a:extLst>
+              <a:ext uri="{FF2B5EF4-FFF2-40B4-BE49-F238E27FC236}">
+                <a16:creationId xmlns:a16="http://schemas.microsoft.com/office/drawing/2014/main" id="{1D605E15-2969-49F8-AC22-045AA75961D9}"/>
+              </a:ext>
+            </a:extLst>
+          </p:cNvPr>
+          <p:cNvSpPr>
+            <a:spLocks noGrp="1"/>
+          </p:cNvSpPr>
+          <p:nvPr>
+            <p:ph type="ftr" sz="quarter" idx="11"/>
+          </p:nvPr>
+        </p:nvSpPr>
+        <p:spPr/>
+        <p:txBody>
+          <a:bodyPr/>
+          <a:lstStyle/>
+          <a:p>
+            <a:r>
+              <a:rPr lang="pl-PL"/>
+              <a:t>@maciejwyrodek</a:t>
+            </a:r>
+          </a:p>
+        </p:txBody>
+      </p:sp>
+      <p:sp>
+        <p:nvSpPr>
+          <p:cNvPr id="8" name="Content Placeholder 2">
+            <a:extLst>
+              <a:ext uri="{FF2B5EF4-FFF2-40B4-BE49-F238E27FC236}">
+                <a16:creationId xmlns:a16="http://schemas.microsoft.com/office/drawing/2014/main" id="{D48A6C4A-2604-4F19-8668-ED41358C3820}"/>
+              </a:ext>
+            </a:extLst>
+          </p:cNvPr>
+          <p:cNvSpPr>
+            <a:spLocks noGrp="1"/>
+          </p:cNvSpPr>
+          <p:nvPr>
+            <p:ph sz="half" idx="2"/>
+          </p:nvPr>
+        </p:nvSpPr>
+        <p:spPr>
+          <a:xfrm>
+            <a:off x="6172200" y="2193925"/>
+            <a:ext cx="5334000" cy="4024313"/>
+          </a:xfrm>
+        </p:spPr>
+        <p:txBody>
+          <a:bodyPr>
+            <a:normAutofit lnSpcReduction="10000"/>
+          </a:bodyPr>
+          <a:lstStyle/>
+          <a:p>
+            <a:pPr marL="0" indent="0">
+              <a:buNone/>
+            </a:pPr>
+            <a:r>
+              <a:rPr lang="pl-PL" dirty="0" err="1"/>
+              <a:t>Other</a:t>
+            </a:r>
+            <a:r>
+              <a:rPr lang="pl-PL" dirty="0"/>
+              <a:t>:</a:t>
+            </a:r>
+          </a:p>
+          <a:p>
+            <a:r>
+              <a:rPr lang="pl-PL" dirty="0">
+                <a:hlinkClick r:id="rId6"/>
+              </a:rPr>
+              <a:t>https://docs.google.com/spreadsheets/d/1r0hCQ_PGyS0upupU5cOqTnRpHSGKq-I_zHdjCrN446Y/edit?usp=sharing</a:t>
+            </a:r>
+            <a:endParaRPr lang="pl-PL" dirty="0"/>
+          </a:p>
+          <a:p>
+            <a:r>
+              <a:rPr lang="pl-PL">
+                <a:hlinkClick r:id="rId7"/>
+              </a:rPr>
+              <a:t>https://jsperf.com/queryselectorall-vs-getelementsbytagname/179</a:t>
+            </a:r>
+            <a:endParaRPr lang="pl-PL"/>
+          </a:p>
+          <a:p>
+            <a:pPr marL="0" indent="0">
+              <a:buNone/>
+            </a:pPr>
+            <a:br>
+              <a:rPr lang="pl-PL" dirty="0"/>
+            </a:br>
+            <a:br>
+              <a:rPr lang="pl-PL" dirty="0"/>
+            </a:br>
+            <a:endParaRPr lang="pl-PL" dirty="0"/>
+          </a:p>
+        </p:txBody>
+      </p:sp>
+    </p:spTree>
+    <p:extLst>
+      <p:ext uri="{BB962C8B-B14F-4D97-AF65-F5344CB8AC3E}">
+        <p14:creationId xmlns:p14="http://schemas.microsoft.com/office/powerpoint/2010/main" val="1801186500"/>
       </p:ext>
     </p:extLst>
   </p:cSld>
@@ -19580,7 +19544,31 @@
             <a:pPr algn="ctr"/>
             <a:r>
               <a:rPr lang="en-US" dirty="0"/>
-              <a:t>This experiment is not valid, it doesn’t reflect real-world scenario, and there is to many variables that could affect result!</a:t>
+              <a:t>This experiment is not valid, it doesn’t reflect real-world scenario, and there </a:t>
+            </a:r>
+            <a:r>
+              <a:rPr lang="pl-PL" dirty="0" err="1"/>
+              <a:t>are</a:t>
+            </a:r>
+            <a:r>
+              <a:rPr lang="en-US" dirty="0"/>
+              <a:t> to</a:t>
+            </a:r>
+            <a:r>
+              <a:rPr lang="pl-PL" dirty="0"/>
+              <a:t>o</a:t>
+            </a:r>
+            <a:r>
+              <a:rPr lang="en-US" dirty="0"/>
+              <a:t> many variables that could affect </a:t>
+            </a:r>
+            <a:r>
+              <a:rPr lang="pl-PL" dirty="0"/>
+              <a:t>the </a:t>
+            </a:r>
+            <a:r>
+              <a:rPr lang="en-US" dirty="0"/>
+              <a:t>result!</a:t>
             </a:r>
             <a:endParaRPr lang="pl-PL" dirty="0"/>
           </a:p>

</xml_diff>